<commit_message>
Outline of ppt completed
</commit_message>
<xml_diff>
--- a/Presentation/Palidromic Trees.pptx
+++ b/Presentation/Palidromic Trees.pptx
@@ -6,7 +6,7 @@
     <p:sldMasterId id="2147483660" r:id="rId2"/>
   </p:sldMasterIdLst>
   <p:notesMasterIdLst>
-    <p:notesMasterId r:id="rId11"/>
+    <p:notesMasterId r:id="rId17"/>
   </p:notesMasterIdLst>
   <p:sldIdLst>
     <p:sldId id="256" r:id="rId3"/>
@@ -14,9 +14,15 @@
     <p:sldId id="265" r:id="rId5"/>
     <p:sldId id="266" r:id="rId6"/>
     <p:sldId id="264" r:id="rId7"/>
-    <p:sldId id="268" r:id="rId8"/>
-    <p:sldId id="269" r:id="rId9"/>
-    <p:sldId id="270" r:id="rId10"/>
+    <p:sldId id="271" r:id="rId8"/>
+    <p:sldId id="268" r:id="rId9"/>
+    <p:sldId id="269" r:id="rId10"/>
+    <p:sldId id="270" r:id="rId11"/>
+    <p:sldId id="272" r:id="rId12"/>
+    <p:sldId id="273" r:id="rId13"/>
+    <p:sldId id="274" r:id="rId14"/>
+    <p:sldId id="275" r:id="rId15"/>
+    <p:sldId id="276" r:id="rId16"/>
   </p:sldIdLst>
   <p:sldSz cx="12192000" cy="6858000"/>
   <p:notesSz cx="6858000" cy="9144000"/>
@@ -115,6 +121,11 @@
       </a:defRPr>
     </a:lvl9pPr>
   </p:defaultTextStyle>
+  <p:extLst>
+    <p:ext uri="{EFAFB233-063F-42B5-8137-9DF3F51BA10A}">
+      <p15:sldGuideLst xmlns:p15="http://schemas.microsoft.com/office/powerpoint/2012/main"/>
+    </p:ext>
+  </p:extLst>
 </p:presentation>
 </file>
 
@@ -564,6 +575,214 @@
         </p:txBody>
       </p:sp>
     </p:spTree>
+  </p:cSld>
+  <p:clrMapOvr>
+    <a:masterClrMapping/>
+  </p:clrMapOvr>
+</p:notes>
+</file>
+
+<file path=ppt/notesSlides/notesSlide2.xml><?xml version="1.0" encoding="utf-8"?>
+<p:notes xmlns:a="http://schemas.openxmlformats.org/drawingml/2006/main" xmlns:r="http://schemas.openxmlformats.org/officeDocument/2006/relationships" xmlns:p="http://schemas.openxmlformats.org/presentationml/2006/main">
+  <p:cSld>
+    <p:spTree>
+      <p:nvGrpSpPr>
+        <p:cNvPr id="1" name=""/>
+        <p:cNvGrpSpPr/>
+        <p:nvPr/>
+      </p:nvGrpSpPr>
+      <p:grpSpPr>
+        <a:xfrm>
+          <a:off x="0" y="0"/>
+          <a:ext cx="0" cy="0"/>
+          <a:chOff x="0" y="0"/>
+          <a:chExt cx="0" cy="0"/>
+        </a:xfrm>
+      </p:grpSpPr>
+      <p:sp>
+        <p:nvSpPr>
+          <p:cNvPr id="2" name="Slide Image Placeholder 1"/>
+          <p:cNvSpPr>
+            <a:spLocks noGrp="1" noRot="1" noChangeAspect="1"/>
+          </p:cNvSpPr>
+          <p:nvPr>
+            <p:ph type="sldImg"/>
+          </p:nvPr>
+        </p:nvSpPr>
+        <p:spPr/>
+      </p:sp>
+      <p:sp>
+        <p:nvSpPr>
+          <p:cNvPr id="3" name="Notes Placeholder 2"/>
+          <p:cNvSpPr>
+            <a:spLocks noGrp="1"/>
+          </p:cNvSpPr>
+          <p:nvPr>
+            <p:ph type="body" idx="1"/>
+          </p:nvPr>
+        </p:nvSpPr>
+        <p:spPr/>
+        <p:txBody>
+          <a:bodyPr/>
+          <a:lstStyle/>
+          <a:p>
+            <a:r>
+              <a:rPr lang="en-US" dirty="0"/>
+              <a:t>Links to explanations:</a:t>
+            </a:r>
+          </a:p>
+          <a:p>
+            <a:pPr marL="171450" indent="-171450">
+              <a:buFontTx/>
+              <a:buChar char="-"/>
+            </a:pPr>
+            <a:r>
+              <a:rPr lang="en-US" dirty="0" err="1"/>
+              <a:t>Eertree</a:t>
+            </a:r>
+            <a:r>
+              <a:rPr lang="en-US" dirty="0"/>
+              <a:t>: https://www.sciencedirect.com/science/article/pii/S0020019021000892#fg0010 </a:t>
+            </a:r>
+          </a:p>
+          <a:p>
+            <a:pPr marL="171450" indent="-171450">
+              <a:buFontTx/>
+              <a:buChar char="-"/>
+            </a:pPr>
+            <a:r>
+              <a:rPr lang="en-US" dirty="0"/>
+              <a:t>Left/right and reversed string: https://javascript.plainenglish.io/the-best-and-worst-way-of-solving-the-palindrome-question-4b7d2f9ada06</a:t>
+            </a:r>
+          </a:p>
+          <a:p>
+            <a:pPr marL="171450" indent="-171450">
+              <a:buFontTx/>
+              <a:buChar char="-"/>
+            </a:pPr>
+            <a:r>
+              <a:rPr lang="en-US" dirty="0"/>
+              <a:t>Fast/slow pointer: https://medium.com/@suprajaraman/problem-statement-palindromes-70ffe1ba1905</a:t>
+            </a:r>
+          </a:p>
+        </p:txBody>
+      </p:sp>
+      <p:sp>
+        <p:nvSpPr>
+          <p:cNvPr id="4" name="Slide Number Placeholder 3"/>
+          <p:cNvSpPr>
+            <a:spLocks noGrp="1"/>
+          </p:cNvSpPr>
+          <p:nvPr>
+            <p:ph type="sldNum" sz="quarter" idx="5"/>
+          </p:nvPr>
+        </p:nvSpPr>
+        <p:spPr/>
+        <p:txBody>
+          <a:bodyPr/>
+          <a:lstStyle/>
+          <a:p>
+            <a:fld id="{05037847-7E9B-4FD2-A4D6-367D5D95454C}" type="slidenum">
+              <a:rPr lang="en-US" smtClean="0"/>
+              <a:t>9</a:t>
+            </a:fld>
+            <a:endParaRPr lang="en-US"/>
+          </a:p>
+        </p:txBody>
+      </p:sp>
+    </p:spTree>
+    <p:extLst>
+      <p:ext uri="{BB962C8B-B14F-4D97-AF65-F5344CB8AC3E}">
+        <p14:creationId xmlns:p14="http://schemas.microsoft.com/office/powerpoint/2010/main" val="2208625636"/>
+      </p:ext>
+    </p:extLst>
+  </p:cSld>
+  <p:clrMapOvr>
+    <a:masterClrMapping/>
+  </p:clrMapOvr>
+</p:notes>
+</file>
+
+<file path=ppt/notesSlides/notesSlide3.xml><?xml version="1.0" encoding="utf-8"?>
+<p:notes xmlns:a="http://schemas.openxmlformats.org/drawingml/2006/main" xmlns:r="http://schemas.openxmlformats.org/officeDocument/2006/relationships" xmlns:p="http://schemas.openxmlformats.org/presentationml/2006/main">
+  <p:cSld>
+    <p:spTree>
+      <p:nvGrpSpPr>
+        <p:cNvPr id="1" name=""/>
+        <p:cNvGrpSpPr/>
+        <p:nvPr/>
+      </p:nvGrpSpPr>
+      <p:grpSpPr>
+        <a:xfrm>
+          <a:off x="0" y="0"/>
+          <a:ext cx="0" cy="0"/>
+          <a:chOff x="0" y="0"/>
+          <a:chExt cx="0" cy="0"/>
+        </a:xfrm>
+      </p:grpSpPr>
+      <p:sp>
+        <p:nvSpPr>
+          <p:cNvPr id="2" name="Slide Image Placeholder 1"/>
+          <p:cNvSpPr>
+            <a:spLocks noGrp="1" noRot="1" noChangeAspect="1"/>
+          </p:cNvSpPr>
+          <p:nvPr>
+            <p:ph type="sldImg"/>
+          </p:nvPr>
+        </p:nvSpPr>
+        <p:spPr/>
+      </p:sp>
+      <p:sp>
+        <p:nvSpPr>
+          <p:cNvPr id="3" name="Notes Placeholder 2"/>
+          <p:cNvSpPr>
+            <a:spLocks noGrp="1"/>
+          </p:cNvSpPr>
+          <p:nvPr>
+            <p:ph type="body" idx="1"/>
+          </p:nvPr>
+        </p:nvSpPr>
+        <p:spPr/>
+        <p:txBody>
+          <a:bodyPr/>
+          <a:lstStyle/>
+          <a:p>
+            <a:r>
+              <a:rPr lang="en-US" dirty="0"/>
+              <a:t>This guy: https://www.sciencedirect.com/science/article/pii/S0020019021000892#fg0010</a:t>
+            </a:r>
+          </a:p>
+        </p:txBody>
+      </p:sp>
+      <p:sp>
+        <p:nvSpPr>
+          <p:cNvPr id="4" name="Slide Number Placeholder 3"/>
+          <p:cNvSpPr>
+            <a:spLocks noGrp="1"/>
+          </p:cNvSpPr>
+          <p:nvPr>
+            <p:ph type="sldNum" sz="quarter" idx="5"/>
+          </p:nvPr>
+        </p:nvSpPr>
+        <p:spPr/>
+        <p:txBody>
+          <a:bodyPr/>
+          <a:lstStyle/>
+          <a:p>
+            <a:fld id="{05037847-7E9B-4FD2-A4D6-367D5D95454C}" type="slidenum">
+              <a:rPr lang="en-US" smtClean="0"/>
+              <a:t>11</a:t>
+            </a:fld>
+            <a:endParaRPr lang="en-US"/>
+          </a:p>
+        </p:txBody>
+      </p:sp>
+    </p:spTree>
+    <p:extLst>
+      <p:ext uri="{BB962C8B-B14F-4D97-AF65-F5344CB8AC3E}">
+        <p14:creationId xmlns:p14="http://schemas.microsoft.com/office/powerpoint/2010/main" val="4021483222"/>
+      </p:ext>
+    </p:extLst>
   </p:cSld>
   <p:clrMapOvr>
     <a:masterClrMapping/>
@@ -17868,6 +18087,2000 @@
   <p:clrMapOvr>
     <a:masterClrMapping/>
   </p:clrMapOvr>
+</p:sld>
+</file>
+
+<file path=ppt/slides/slide10.xml><?xml version="1.0" encoding="utf-8"?>
+<p:sld xmlns:a="http://schemas.openxmlformats.org/drawingml/2006/main" xmlns:r="http://schemas.openxmlformats.org/officeDocument/2006/relationships" xmlns:p="http://schemas.openxmlformats.org/presentationml/2006/main">
+  <p:cSld>
+    <p:spTree>
+      <p:nvGrpSpPr>
+        <p:cNvPr id="1" name=""/>
+        <p:cNvGrpSpPr/>
+        <p:nvPr/>
+      </p:nvGrpSpPr>
+      <p:grpSpPr>
+        <a:xfrm>
+          <a:off x="0" y="0"/>
+          <a:ext cx="0" cy="0"/>
+          <a:chOff x="0" y="0"/>
+          <a:chExt cx="0" cy="0"/>
+        </a:xfrm>
+      </p:grpSpPr>
+      <p:sp>
+        <p:nvSpPr>
+          <p:cNvPr id="3" name="Title 1">
+            <a:extLst>
+              <a:ext uri="{FF2B5EF4-FFF2-40B4-BE49-F238E27FC236}">
+                <a16:creationId xmlns:a16="http://schemas.microsoft.com/office/drawing/2014/main" id="{143D2B39-9F82-430B-97BC-DDD9D97D02E7}"/>
+              </a:ext>
+            </a:extLst>
+          </p:cNvPr>
+          <p:cNvSpPr txBox="1">
+            <a:spLocks/>
+          </p:cNvSpPr>
+          <p:nvPr/>
+        </p:nvSpPr>
+        <p:spPr>
+          <a:xfrm>
+            <a:off x="615043" y="2529341"/>
+            <a:ext cx="10961914" cy="1799318"/>
+          </a:xfrm>
+          <a:prstGeom prst="roundRect">
+            <a:avLst>
+              <a:gd name="adj" fmla="val 50000"/>
+            </a:avLst>
+          </a:prstGeom>
+          <a:solidFill>
+            <a:schemeClr val="bg1"/>
+          </a:solidFill>
+          <a:effectLst>
+            <a:outerShdw blurRad="50800" dist="38100" dir="8100000" algn="tr" rotWithShape="0">
+              <a:prstClr val="black">
+                <a:alpha val="40000"/>
+              </a:prstClr>
+            </a:outerShdw>
+          </a:effectLst>
+        </p:spPr>
+        <p:txBody>
+          <a:bodyPr wrap="square" lIns="0" tIns="108000" anchor="ctr" anchorCtr="0">
+            <a:normAutofit fontScale="85000" lnSpcReduction="10000"/>
+          </a:bodyPr>
+          <a:lstStyle>
+            <a:lvl1pPr algn="l" defTabSz="914400" rtl="0" eaLnBrk="1" latinLnBrk="0" hangingPunct="1">
+              <a:lnSpc>
+                <a:spcPct val="90000"/>
+              </a:lnSpc>
+              <a:spcBef>
+                <a:spcPct val="0"/>
+              </a:spcBef>
+              <a:buNone/>
+              <a:defRPr sz="4400" kern="1200">
+                <a:solidFill>
+                  <a:schemeClr val="tx1"/>
+                </a:solidFill>
+                <a:latin typeface="+mj-lt"/>
+                <a:ea typeface="+mj-ea"/>
+                <a:cs typeface="+mj-cs"/>
+              </a:defRPr>
+            </a:lvl1pPr>
+          </a:lstStyle>
+          <a:p>
+            <a:pPr algn="ctr"/>
+            <a:r>
+              <a:rPr lang="en-US" sz="6000" b="1" dirty="0">
+                <a:latin typeface="Space Mono" panose="02000509040000020004" charset="0"/>
+              </a:rPr>
+              <a:t>Complexity of an </a:t>
+            </a:r>
+            <a:r>
+              <a:rPr lang="en-US" sz="6000" b="1" dirty="0" err="1">
+                <a:latin typeface="Space Mono" panose="02000509040000020004" charset="0"/>
+              </a:rPr>
+              <a:t>eertree</a:t>
+            </a:r>
+            <a:endParaRPr lang="en-US" sz="6000" b="1" dirty="0">
+              <a:latin typeface="Space Mono" panose="02000509040000020004" charset="0"/>
+            </a:endParaRPr>
+          </a:p>
+        </p:txBody>
+      </p:sp>
+      <p:sp>
+        <p:nvSpPr>
+          <p:cNvPr id="4" name="TextBox 3">
+            <a:extLst>
+              <a:ext uri="{FF2B5EF4-FFF2-40B4-BE49-F238E27FC236}">
+                <a16:creationId xmlns:a16="http://schemas.microsoft.com/office/drawing/2014/main" id="{5D538C93-2F5C-472F-8A46-A004C8B54BB8}"/>
+              </a:ext>
+            </a:extLst>
+          </p:cNvPr>
+          <p:cNvSpPr txBox="1"/>
+          <p:nvPr/>
+        </p:nvSpPr>
+        <p:spPr>
+          <a:xfrm rot="21269864">
+            <a:off x="4736893" y="4802383"/>
+            <a:ext cx="2718212" cy="584775"/>
+          </a:xfrm>
+          <a:prstGeom prst="rect">
+            <a:avLst/>
+          </a:prstGeom>
+          <a:noFill/>
+        </p:spPr>
+        <p:txBody>
+          <a:bodyPr wrap="square">
+            <a:spAutoFit/>
+          </a:bodyPr>
+          <a:lstStyle/>
+          <a:p>
+            <a:pPr algn="ctr"/>
+            <a:r>
+              <a:rPr lang="en-US" sz="3200" b="1" dirty="0">
+                <a:latin typeface="Space Mono" panose="02000509040000020004" charset="0"/>
+              </a:rPr>
+              <a:t>O(</a:t>
+            </a:r>
+            <a:r>
+              <a:rPr lang="en-US" sz="3200" b="1" dirty="0" err="1">
+                <a:latin typeface="Space Mono" panose="02000509040000020004" charset="0"/>
+              </a:rPr>
+              <a:t>nlog</a:t>
+            </a:r>
+            <a:r>
+              <a:rPr lang="el-GR" sz="3200" b="1" i="1" dirty="0">
+                <a:latin typeface="Space Mono" panose="02000509040000020004" charset="0"/>
+              </a:rPr>
+              <a:t>σ</a:t>
+            </a:r>
+            <a:r>
+              <a:rPr lang="en-US" sz="3200" b="1" dirty="0">
+                <a:latin typeface="Space Mono" panose="02000509040000020004" charset="0"/>
+              </a:rPr>
+              <a:t>)</a:t>
+            </a:r>
+          </a:p>
+        </p:txBody>
+      </p:sp>
+      <p:sp>
+        <p:nvSpPr>
+          <p:cNvPr id="6" name="TextBox 5">
+            <a:extLst>
+              <a:ext uri="{FF2B5EF4-FFF2-40B4-BE49-F238E27FC236}">
+                <a16:creationId xmlns:a16="http://schemas.microsoft.com/office/drawing/2014/main" id="{3C86C099-D33A-4CC5-8C34-9B204AD1F2D8}"/>
+              </a:ext>
+            </a:extLst>
+          </p:cNvPr>
+          <p:cNvSpPr txBox="1"/>
+          <p:nvPr/>
+        </p:nvSpPr>
+        <p:spPr>
+          <a:xfrm rot="21396326">
+            <a:off x="8334429" y="5961901"/>
+            <a:ext cx="3425804" cy="461665"/>
+          </a:xfrm>
+          <a:prstGeom prst="rect">
+            <a:avLst/>
+          </a:prstGeom>
+          <a:noFill/>
+        </p:spPr>
+        <p:txBody>
+          <a:bodyPr wrap="square">
+            <a:spAutoFit/>
+          </a:bodyPr>
+          <a:lstStyle/>
+          <a:p>
+            <a:r>
+              <a:rPr lang="en-US" sz="1200" b="1" dirty="0">
+                <a:latin typeface="Space Mono" panose="02000509040000020004" charset="0"/>
+              </a:rPr>
+              <a:t>&gt; But why? (2)</a:t>
+            </a:r>
+          </a:p>
+          <a:p>
+            <a:pPr algn="r"/>
+            <a:r>
+              <a:rPr lang="en-US" sz="1200" b="1" dirty="0">
+                <a:latin typeface="Space Mono" panose="02000509040000020004" charset="0"/>
+              </a:rPr>
+              <a:t> (2) Hold on, we’ll get there. &lt;</a:t>
+            </a:r>
+          </a:p>
+        </p:txBody>
+      </p:sp>
+    </p:spTree>
+    <p:extLst>
+      <p:ext uri="{BB962C8B-B14F-4D97-AF65-F5344CB8AC3E}">
+        <p14:creationId xmlns:p14="http://schemas.microsoft.com/office/powerpoint/2010/main" val="3985846100"/>
+      </p:ext>
+    </p:extLst>
+  </p:cSld>
+  <p:clrMapOvr>
+    <a:masterClrMapping/>
+  </p:clrMapOvr>
+  <mc:AlternateContent xmlns:mc="http://schemas.openxmlformats.org/markup-compatibility/2006">
+    <mc:Choice xmlns:p159="http://schemas.microsoft.com/office/powerpoint/2015/09/main" Requires="p159">
+      <p:transition spd="slow">
+        <p159:morph option="byWord"/>
+      </p:transition>
+    </mc:Choice>
+    <mc:Fallback>
+      <p:transition spd="slow">
+        <p:fade/>
+      </p:transition>
+    </mc:Fallback>
+  </mc:AlternateContent>
+</p:sld>
+</file>
+
+<file path=ppt/slides/slide11.xml><?xml version="1.0" encoding="utf-8"?>
+<p:sld xmlns:a="http://schemas.openxmlformats.org/drawingml/2006/main" xmlns:r="http://schemas.openxmlformats.org/officeDocument/2006/relationships" xmlns:p="http://schemas.openxmlformats.org/presentationml/2006/main">
+  <p:cSld>
+    <p:spTree>
+      <p:nvGrpSpPr>
+        <p:cNvPr id="1" name=""/>
+        <p:cNvGrpSpPr/>
+        <p:nvPr/>
+      </p:nvGrpSpPr>
+      <p:grpSpPr>
+        <a:xfrm>
+          <a:off x="0" y="0"/>
+          <a:ext cx="0" cy="0"/>
+          <a:chOff x="0" y="0"/>
+          <a:chExt cx="0" cy="0"/>
+        </a:xfrm>
+      </p:grpSpPr>
+      <p:sp>
+        <p:nvSpPr>
+          <p:cNvPr id="2" name="Title 1">
+            <a:extLst>
+              <a:ext uri="{FF2B5EF4-FFF2-40B4-BE49-F238E27FC236}">
+                <a16:creationId xmlns:a16="http://schemas.microsoft.com/office/drawing/2014/main" id="{EEAF7A6E-3499-44E1-861D-3724065BF641}"/>
+              </a:ext>
+            </a:extLst>
+          </p:cNvPr>
+          <p:cNvSpPr txBox="1">
+            <a:spLocks/>
+          </p:cNvSpPr>
+          <p:nvPr/>
+        </p:nvSpPr>
+        <p:spPr>
+          <a:xfrm>
+            <a:off x="504207" y="340323"/>
+            <a:ext cx="10961914" cy="1799318"/>
+          </a:xfrm>
+          <a:prstGeom prst="roundRect">
+            <a:avLst>
+              <a:gd name="adj" fmla="val 50000"/>
+            </a:avLst>
+          </a:prstGeom>
+          <a:solidFill>
+            <a:schemeClr val="bg1"/>
+          </a:solidFill>
+          <a:effectLst>
+            <a:outerShdw blurRad="50800" dist="38100" dir="8100000" algn="tr" rotWithShape="0">
+              <a:prstClr val="black">
+                <a:alpha val="40000"/>
+              </a:prstClr>
+            </a:outerShdw>
+          </a:effectLst>
+        </p:spPr>
+        <p:txBody>
+          <a:bodyPr wrap="square" lIns="0" tIns="108000" anchor="ctr" anchorCtr="0">
+            <a:normAutofit fontScale="85000" lnSpcReduction="10000"/>
+          </a:bodyPr>
+          <a:lstStyle>
+            <a:lvl1pPr algn="l" defTabSz="914400" rtl="0" eaLnBrk="1" latinLnBrk="0" hangingPunct="1">
+              <a:lnSpc>
+                <a:spcPct val="90000"/>
+              </a:lnSpc>
+              <a:spcBef>
+                <a:spcPct val="0"/>
+              </a:spcBef>
+              <a:buNone/>
+              <a:defRPr sz="4400" kern="1200">
+                <a:solidFill>
+                  <a:schemeClr val="tx1"/>
+                </a:solidFill>
+                <a:latin typeface="+mj-lt"/>
+                <a:ea typeface="+mj-ea"/>
+                <a:cs typeface="+mj-cs"/>
+              </a:defRPr>
+            </a:lvl1pPr>
+          </a:lstStyle>
+          <a:p>
+            <a:pPr algn="ctr"/>
+            <a:r>
+              <a:rPr lang="en-US" sz="6000" b="1" dirty="0">
+                <a:latin typeface="Space Mono" panose="02000509040000020004" charset="0"/>
+              </a:rPr>
+              <a:t>Complexity of an </a:t>
+            </a:r>
+            <a:r>
+              <a:rPr lang="en-US" sz="6000" b="1" dirty="0" err="1">
+                <a:latin typeface="Space Mono" panose="02000509040000020004" charset="0"/>
+              </a:rPr>
+              <a:t>eertree</a:t>
+            </a:r>
+            <a:endParaRPr lang="en-US" sz="6000" b="1" dirty="0">
+              <a:latin typeface="Space Mono" panose="02000509040000020004" charset="0"/>
+            </a:endParaRPr>
+          </a:p>
+        </p:txBody>
+      </p:sp>
+      <p:sp>
+        <p:nvSpPr>
+          <p:cNvPr id="3" name="Title 1">
+            <a:extLst>
+              <a:ext uri="{FF2B5EF4-FFF2-40B4-BE49-F238E27FC236}">
+                <a16:creationId xmlns:a16="http://schemas.microsoft.com/office/drawing/2014/main" id="{7A668CF6-6F3B-4A4E-8E54-A76593484CB4}"/>
+              </a:ext>
+            </a:extLst>
+          </p:cNvPr>
+          <p:cNvSpPr txBox="1">
+            <a:spLocks/>
+          </p:cNvSpPr>
+          <p:nvPr/>
+        </p:nvSpPr>
+        <p:spPr>
+          <a:xfrm>
+            <a:off x="615043" y="2529341"/>
+            <a:ext cx="10961914" cy="1799318"/>
+          </a:xfrm>
+          <a:prstGeom prst="roundRect">
+            <a:avLst>
+              <a:gd name="adj" fmla="val 50000"/>
+            </a:avLst>
+          </a:prstGeom>
+          <a:solidFill>
+            <a:schemeClr val="bg1"/>
+          </a:solidFill>
+          <a:effectLst>
+            <a:outerShdw blurRad="50800" dist="38100" dir="8100000" algn="tr" rotWithShape="0">
+              <a:prstClr val="black">
+                <a:alpha val="40000"/>
+              </a:prstClr>
+            </a:outerShdw>
+          </a:effectLst>
+        </p:spPr>
+        <p:txBody>
+          <a:bodyPr wrap="square" lIns="0" tIns="108000" anchor="ctr" anchorCtr="0">
+            <a:normAutofit fontScale="77500" lnSpcReduction="20000"/>
+          </a:bodyPr>
+          <a:lstStyle>
+            <a:lvl1pPr algn="l" defTabSz="914400" rtl="0" eaLnBrk="1" latinLnBrk="0" hangingPunct="1">
+              <a:lnSpc>
+                <a:spcPct val="90000"/>
+              </a:lnSpc>
+              <a:spcBef>
+                <a:spcPct val="0"/>
+              </a:spcBef>
+              <a:buNone/>
+              <a:defRPr sz="4400" kern="1200">
+                <a:solidFill>
+                  <a:schemeClr val="tx1"/>
+                </a:solidFill>
+                <a:latin typeface="+mj-lt"/>
+                <a:ea typeface="+mj-ea"/>
+                <a:cs typeface="+mj-cs"/>
+              </a:defRPr>
+            </a:lvl1pPr>
+          </a:lstStyle>
+          <a:p>
+            <a:pPr algn="ctr"/>
+            <a:r>
+              <a:rPr lang="en-US" sz="6000" b="1" dirty="0">
+                <a:latin typeface="Space Mono" panose="02000509040000020004" charset="0"/>
+              </a:rPr>
+              <a:t>Insert complexity analysis here</a:t>
+            </a:r>
+          </a:p>
+        </p:txBody>
+      </p:sp>
+    </p:spTree>
+    <p:extLst>
+      <p:ext uri="{BB962C8B-B14F-4D97-AF65-F5344CB8AC3E}">
+        <p14:creationId xmlns:p14="http://schemas.microsoft.com/office/powerpoint/2010/main" val="1925181866"/>
+      </p:ext>
+    </p:extLst>
+  </p:cSld>
+  <p:clrMapOvr>
+    <a:masterClrMapping/>
+  </p:clrMapOvr>
+  <mc:AlternateContent xmlns:mc="http://schemas.openxmlformats.org/markup-compatibility/2006">
+    <mc:Choice xmlns:p159="http://schemas.microsoft.com/office/powerpoint/2015/09/main" Requires="p159">
+      <p:transition spd="slow">
+        <p159:morph option="byObject"/>
+      </p:transition>
+    </mc:Choice>
+    <mc:Fallback>
+      <p:transition spd="slow">
+        <p:fade/>
+      </p:transition>
+    </mc:Fallback>
+  </mc:AlternateContent>
+</p:sld>
+</file>
+
+<file path=ppt/slides/slide12.xml><?xml version="1.0" encoding="utf-8"?>
+<p:sld xmlns:a="http://schemas.openxmlformats.org/drawingml/2006/main" xmlns:r="http://schemas.openxmlformats.org/officeDocument/2006/relationships" xmlns:p="http://schemas.openxmlformats.org/presentationml/2006/main">
+  <p:cSld>
+    <p:spTree>
+      <p:nvGrpSpPr>
+        <p:cNvPr id="1" name=""/>
+        <p:cNvGrpSpPr/>
+        <p:nvPr/>
+      </p:nvGrpSpPr>
+      <p:grpSpPr>
+        <a:xfrm>
+          <a:off x="0" y="0"/>
+          <a:ext cx="0" cy="0"/>
+          <a:chOff x="0" y="0"/>
+          <a:chExt cx="0" cy="0"/>
+        </a:xfrm>
+      </p:grpSpPr>
+      <p:sp>
+        <p:nvSpPr>
+          <p:cNvPr id="3" name="Title 1">
+            <a:extLst>
+              <a:ext uri="{FF2B5EF4-FFF2-40B4-BE49-F238E27FC236}">
+                <a16:creationId xmlns:a16="http://schemas.microsoft.com/office/drawing/2014/main" id="{143D2B39-9F82-430B-97BC-DDD9D97D02E7}"/>
+              </a:ext>
+            </a:extLst>
+          </p:cNvPr>
+          <p:cNvSpPr txBox="1">
+            <a:spLocks/>
+          </p:cNvSpPr>
+          <p:nvPr/>
+        </p:nvSpPr>
+        <p:spPr>
+          <a:xfrm>
+            <a:off x="615043" y="2529341"/>
+            <a:ext cx="10961914" cy="1799318"/>
+          </a:xfrm>
+          <a:prstGeom prst="roundRect">
+            <a:avLst>
+              <a:gd name="adj" fmla="val 50000"/>
+            </a:avLst>
+          </a:prstGeom>
+          <a:solidFill>
+            <a:schemeClr val="bg1"/>
+          </a:solidFill>
+          <a:effectLst>
+            <a:outerShdw blurRad="50800" dist="38100" dir="8100000" algn="tr" rotWithShape="0">
+              <a:prstClr val="black">
+                <a:alpha val="40000"/>
+              </a:prstClr>
+            </a:outerShdw>
+          </a:effectLst>
+        </p:spPr>
+        <p:txBody>
+          <a:bodyPr wrap="square" lIns="0" tIns="108000" anchor="ctr" anchorCtr="0">
+            <a:normAutofit fontScale="85000" lnSpcReduction="10000"/>
+          </a:bodyPr>
+          <a:lstStyle>
+            <a:lvl1pPr algn="l" defTabSz="914400" rtl="0" eaLnBrk="1" latinLnBrk="0" hangingPunct="1">
+              <a:lnSpc>
+                <a:spcPct val="90000"/>
+              </a:lnSpc>
+              <a:spcBef>
+                <a:spcPct val="0"/>
+              </a:spcBef>
+              <a:buNone/>
+              <a:defRPr sz="4400" kern="1200">
+                <a:solidFill>
+                  <a:schemeClr val="tx1"/>
+                </a:solidFill>
+                <a:latin typeface="+mj-lt"/>
+                <a:ea typeface="+mj-ea"/>
+                <a:cs typeface="+mj-cs"/>
+              </a:defRPr>
+            </a:lvl1pPr>
+          </a:lstStyle>
+          <a:p>
+            <a:pPr algn="ctr"/>
+            <a:r>
+              <a:rPr lang="en-US" sz="6000" b="1" dirty="0">
+                <a:latin typeface="Space Mono" panose="02000509040000020004" charset="0"/>
+              </a:rPr>
+              <a:t>Complexity of an </a:t>
+            </a:r>
+            <a:r>
+              <a:rPr lang="en-US" sz="6000" b="1" dirty="0" err="1">
+                <a:latin typeface="Space Mono" panose="02000509040000020004" charset="0"/>
+              </a:rPr>
+              <a:t>eertree</a:t>
+            </a:r>
+            <a:endParaRPr lang="en-US" sz="6000" b="1" dirty="0">
+              <a:latin typeface="Space Mono" panose="02000509040000020004" charset="0"/>
+            </a:endParaRPr>
+          </a:p>
+        </p:txBody>
+      </p:sp>
+      <p:sp>
+        <p:nvSpPr>
+          <p:cNvPr id="6" name="TextBox 5">
+            <a:extLst>
+              <a:ext uri="{FF2B5EF4-FFF2-40B4-BE49-F238E27FC236}">
+                <a16:creationId xmlns:a16="http://schemas.microsoft.com/office/drawing/2014/main" id="{3C86C099-D33A-4CC5-8C34-9B204AD1F2D8}"/>
+              </a:ext>
+            </a:extLst>
+          </p:cNvPr>
+          <p:cNvSpPr txBox="1"/>
+          <p:nvPr/>
+        </p:nvSpPr>
+        <p:spPr>
+          <a:xfrm rot="21396326">
+            <a:off x="8334429" y="5961901"/>
+            <a:ext cx="3425804" cy="461665"/>
+          </a:xfrm>
+          <a:prstGeom prst="rect">
+            <a:avLst/>
+          </a:prstGeom>
+          <a:noFill/>
+        </p:spPr>
+        <p:txBody>
+          <a:bodyPr wrap="square">
+            <a:spAutoFit/>
+          </a:bodyPr>
+          <a:lstStyle/>
+          <a:p>
+            <a:r>
+              <a:rPr lang="en-US" sz="1200" b="1" dirty="0">
+                <a:latin typeface="Space Mono" panose="02000509040000020004" charset="0"/>
+              </a:rPr>
+              <a:t>&gt; But why? (2)</a:t>
+            </a:r>
+          </a:p>
+          <a:p>
+            <a:pPr algn="r"/>
+            <a:r>
+              <a:rPr lang="en-US" sz="1200" b="1" dirty="0">
+                <a:latin typeface="Space Mono" panose="02000509040000020004" charset="0"/>
+              </a:rPr>
+              <a:t> (2) Hold on, we’ll get there. &lt;</a:t>
+            </a:r>
+          </a:p>
+        </p:txBody>
+      </p:sp>
+      <p:grpSp>
+        <p:nvGrpSpPr>
+          <p:cNvPr id="9" name="Group 8">
+            <a:extLst>
+              <a:ext uri="{FF2B5EF4-FFF2-40B4-BE49-F238E27FC236}">
+                <a16:creationId xmlns:a16="http://schemas.microsoft.com/office/drawing/2014/main" id="{10BECB77-7D53-4A30-8BB7-DEAF7BD559FA}"/>
+              </a:ext>
+            </a:extLst>
+          </p:cNvPr>
+          <p:cNvGrpSpPr/>
+          <p:nvPr/>
+        </p:nvGrpSpPr>
+        <p:grpSpPr>
+          <a:xfrm>
+            <a:off x="4735234" y="4626200"/>
+            <a:ext cx="3438388" cy="726431"/>
+            <a:chOff x="4735234" y="4626200"/>
+            <a:chExt cx="3438388" cy="726431"/>
+          </a:xfrm>
+        </p:grpSpPr>
+        <p:sp>
+          <p:nvSpPr>
+            <p:cNvPr id="4" name="TextBox 3">
+              <a:extLst>
+                <a:ext uri="{FF2B5EF4-FFF2-40B4-BE49-F238E27FC236}">
+                  <a16:creationId xmlns:a16="http://schemas.microsoft.com/office/drawing/2014/main" id="{5D538C93-2F5C-472F-8A46-A004C8B54BB8}"/>
+                </a:ext>
+              </a:extLst>
+            </p:cNvPr>
+            <p:cNvSpPr txBox="1"/>
+            <p:nvPr/>
+          </p:nvSpPr>
+          <p:spPr>
+            <a:xfrm rot="21269864">
+              <a:off x="4735234" y="4767856"/>
+              <a:ext cx="3438388" cy="584775"/>
+            </a:xfrm>
+            <a:prstGeom prst="rect">
+              <a:avLst/>
+            </a:prstGeom>
+            <a:noFill/>
+          </p:spPr>
+          <p:txBody>
+            <a:bodyPr wrap="square">
+              <a:spAutoFit/>
+            </a:bodyPr>
+            <a:lstStyle/>
+            <a:p>
+              <a:pPr algn="ctr"/>
+              <a:r>
+                <a:rPr lang="en-US" sz="3200" b="1" dirty="0">
+                  <a:latin typeface="Space Mono" panose="02000509040000020004" charset="0"/>
+                </a:rPr>
+                <a:t>O(</a:t>
+              </a:r>
+              <a:r>
+                <a:rPr lang="en-US" sz="3200" b="1" dirty="0" err="1">
+                  <a:latin typeface="Space Mono" panose="02000509040000020004" charset="0"/>
+                </a:rPr>
+                <a:t>nlog</a:t>
+              </a:r>
+              <a:r>
+                <a:rPr lang="el-GR" sz="3200" b="1" i="1" dirty="0">
+                  <a:latin typeface="Space Mono" panose="02000509040000020004" charset="0"/>
+                </a:rPr>
+                <a:t>σ</a:t>
+              </a:r>
+              <a:r>
+                <a:rPr lang="en-US" sz="3200" b="1" dirty="0">
+                  <a:latin typeface="Space Mono" panose="02000509040000020004" charset="0"/>
+                </a:rPr>
+                <a:t>)</a:t>
+              </a:r>
+            </a:p>
+          </p:txBody>
+        </p:sp>
+        <p:sp>
+          <p:nvSpPr>
+            <p:cNvPr id="8" name="TextBox 7">
+              <a:extLst>
+                <a:ext uri="{FF2B5EF4-FFF2-40B4-BE49-F238E27FC236}">
+                  <a16:creationId xmlns:a16="http://schemas.microsoft.com/office/drawing/2014/main" id="{2BB345B7-6B6F-4BDE-9B84-B864EFD0D909}"/>
+                </a:ext>
+              </a:extLst>
+            </p:cNvPr>
+            <p:cNvSpPr txBox="1"/>
+            <p:nvPr/>
+          </p:nvSpPr>
+          <p:spPr>
+            <a:xfrm>
+              <a:off x="7462684" y="4626200"/>
+              <a:ext cx="634180" cy="584775"/>
+            </a:xfrm>
+            <a:prstGeom prst="rect">
+              <a:avLst/>
+            </a:prstGeom>
+            <a:noFill/>
+          </p:spPr>
+          <p:txBody>
+            <a:bodyPr wrap="square">
+              <a:spAutoFit/>
+            </a:bodyPr>
+            <a:lstStyle/>
+            <a:p>
+              <a:pPr algn="ctr"/>
+              <a:r>
+                <a:rPr kumimoji="0" lang="en-US" sz="3200" b="1" i="0" u="none" strike="noStrike" kern="1200" cap="none" spc="0" normalizeH="0" baseline="0" noProof="0" dirty="0">
+                  <a:ln>
+                    <a:noFill/>
+                  </a:ln>
+                  <a:solidFill>
+                    <a:prstClr val="black"/>
+                  </a:solidFill>
+                  <a:effectLst/>
+                  <a:uLnTx/>
+                  <a:uFillTx/>
+                  <a:latin typeface="Space Mono" panose="02000509040000020004" charset="0"/>
+                  <a:ea typeface="+mn-ea"/>
+                  <a:cs typeface="+mn-cs"/>
+                </a:rPr>
+                <a:t>✅</a:t>
+              </a:r>
+              <a:endParaRPr lang="en-US" dirty="0"/>
+            </a:p>
+          </p:txBody>
+        </p:sp>
+      </p:grpSp>
+    </p:spTree>
+    <p:extLst>
+      <p:ext uri="{BB962C8B-B14F-4D97-AF65-F5344CB8AC3E}">
+        <p14:creationId xmlns:p14="http://schemas.microsoft.com/office/powerpoint/2010/main" val="590344408"/>
+      </p:ext>
+    </p:extLst>
+  </p:cSld>
+  <p:clrMapOvr>
+    <a:masterClrMapping/>
+  </p:clrMapOvr>
+  <mc:AlternateContent xmlns:mc="http://schemas.openxmlformats.org/markup-compatibility/2006">
+    <mc:Choice xmlns:p159="http://schemas.microsoft.com/office/powerpoint/2015/09/main" Requires="p159">
+      <p:transition spd="slow">
+        <p159:morph option="byWord"/>
+      </p:transition>
+    </mc:Choice>
+    <mc:Fallback>
+      <p:transition spd="slow">
+        <p:fade/>
+      </p:transition>
+    </mc:Fallback>
+  </mc:AlternateContent>
+</p:sld>
+</file>
+
+<file path=ppt/slides/slide13.xml><?xml version="1.0" encoding="utf-8"?>
+<p:sld xmlns:a="http://schemas.openxmlformats.org/drawingml/2006/main" xmlns:r="http://schemas.openxmlformats.org/officeDocument/2006/relationships" xmlns:p="http://schemas.openxmlformats.org/presentationml/2006/main">
+  <p:cSld>
+    <p:spTree>
+      <p:nvGrpSpPr>
+        <p:cNvPr id="1" name=""/>
+        <p:cNvGrpSpPr/>
+        <p:nvPr/>
+      </p:nvGrpSpPr>
+      <p:grpSpPr>
+        <a:xfrm>
+          <a:off x="0" y="0"/>
+          <a:ext cx="0" cy="0"/>
+          <a:chOff x="0" y="0"/>
+          <a:chExt cx="0" cy="0"/>
+        </a:xfrm>
+      </p:grpSpPr>
+      <p:sp>
+        <p:nvSpPr>
+          <p:cNvPr id="2" name="TextBox 1">
+            <a:extLst>
+              <a:ext uri="{FF2B5EF4-FFF2-40B4-BE49-F238E27FC236}">
+                <a16:creationId xmlns:a16="http://schemas.microsoft.com/office/drawing/2014/main" id="{716FE756-C7B7-4858-A811-2B24AC04E9BA}"/>
+              </a:ext>
+            </a:extLst>
+          </p:cNvPr>
+          <p:cNvSpPr txBox="1"/>
+          <p:nvPr/>
+        </p:nvSpPr>
+        <p:spPr>
+          <a:xfrm rot="21396326">
+            <a:off x="3393943" y="3105836"/>
+            <a:ext cx="5136172" cy="646331"/>
+          </a:xfrm>
+          <a:prstGeom prst="rect">
+            <a:avLst/>
+          </a:prstGeom>
+          <a:noFill/>
+        </p:spPr>
+        <p:txBody>
+          <a:bodyPr wrap="square">
+            <a:spAutoFit/>
+          </a:bodyPr>
+          <a:lstStyle/>
+          <a:p>
+            <a:pPr algn="ctr"/>
+            <a:r>
+              <a:rPr lang="en-US" sz="3600" b="1" dirty="0">
+                <a:latin typeface="Space Mono" panose="02000509040000020004" charset="0"/>
+              </a:rPr>
+              <a:t>&gt; But why?</a:t>
+            </a:r>
+          </a:p>
+        </p:txBody>
+      </p:sp>
+      <p:sp>
+        <p:nvSpPr>
+          <p:cNvPr id="3" name="Title 1">
+            <a:extLst>
+              <a:ext uri="{FF2B5EF4-FFF2-40B4-BE49-F238E27FC236}">
+                <a16:creationId xmlns:a16="http://schemas.microsoft.com/office/drawing/2014/main" id="{F1833166-06EC-40CD-8628-501C412563E4}"/>
+              </a:ext>
+            </a:extLst>
+          </p:cNvPr>
+          <p:cNvSpPr txBox="1">
+            <a:spLocks/>
+          </p:cNvSpPr>
+          <p:nvPr/>
+        </p:nvSpPr>
+        <p:spPr>
+          <a:xfrm>
+            <a:off x="615043" y="2529342"/>
+            <a:ext cx="10961914" cy="1799318"/>
+          </a:xfrm>
+          <a:prstGeom prst="roundRect">
+            <a:avLst>
+              <a:gd name="adj" fmla="val 50000"/>
+            </a:avLst>
+          </a:prstGeom>
+          <a:solidFill>
+            <a:schemeClr val="bg1"/>
+          </a:solidFill>
+          <a:effectLst>
+            <a:outerShdw blurRad="50800" dist="38100" dir="8100000" algn="tr" rotWithShape="0">
+              <a:prstClr val="black">
+                <a:alpha val="40000"/>
+              </a:prstClr>
+            </a:outerShdw>
+          </a:effectLst>
+        </p:spPr>
+        <p:txBody>
+          <a:bodyPr wrap="square" lIns="0" tIns="108000" anchor="ctr" anchorCtr="0">
+            <a:normAutofit fontScale="85000" lnSpcReduction="10000"/>
+          </a:bodyPr>
+          <a:lstStyle>
+            <a:lvl1pPr algn="l" defTabSz="914400" rtl="0" eaLnBrk="1" latinLnBrk="0" hangingPunct="1">
+              <a:lnSpc>
+                <a:spcPct val="90000"/>
+              </a:lnSpc>
+              <a:spcBef>
+                <a:spcPct val="0"/>
+              </a:spcBef>
+              <a:buNone/>
+              <a:defRPr sz="4400" kern="1200">
+                <a:solidFill>
+                  <a:schemeClr val="tx1"/>
+                </a:solidFill>
+                <a:latin typeface="+mj-lt"/>
+                <a:ea typeface="+mj-ea"/>
+                <a:cs typeface="+mj-cs"/>
+              </a:defRPr>
+            </a:lvl1pPr>
+          </a:lstStyle>
+          <a:p>
+            <a:pPr algn="ctr"/>
+            <a:r>
+              <a:rPr lang="en-US" sz="6000" b="1" dirty="0">
+                <a:latin typeface="Space Mono" panose="02000509040000020004" charset="0"/>
+              </a:rPr>
+              <a:t>Applications of </a:t>
+            </a:r>
+            <a:r>
+              <a:rPr lang="en-US" sz="6000" b="1" dirty="0" err="1">
+                <a:latin typeface="Space Mono" panose="02000509040000020004" charset="0"/>
+              </a:rPr>
+              <a:t>Eertrees</a:t>
+            </a:r>
+            <a:endParaRPr lang="en-US" sz="6000" b="1" dirty="0">
+              <a:latin typeface="Space Mono" panose="02000509040000020004" charset="0"/>
+            </a:endParaRPr>
+          </a:p>
+        </p:txBody>
+      </p:sp>
+      <p:sp>
+        <p:nvSpPr>
+          <p:cNvPr id="7" name="TextBox 6">
+            <a:extLst>
+              <a:ext uri="{FF2B5EF4-FFF2-40B4-BE49-F238E27FC236}">
+                <a16:creationId xmlns:a16="http://schemas.microsoft.com/office/drawing/2014/main" id="{004EB923-E390-4584-9D7E-8DD241E1FA4F}"/>
+              </a:ext>
+            </a:extLst>
+          </p:cNvPr>
+          <p:cNvSpPr txBox="1"/>
+          <p:nvPr/>
+        </p:nvSpPr>
+        <p:spPr>
+          <a:xfrm rot="20195153">
+            <a:off x="10320182" y="3866994"/>
+            <a:ext cx="1272050" cy="923330"/>
+          </a:xfrm>
+          <a:prstGeom prst="rect">
+            <a:avLst/>
+          </a:prstGeom>
+          <a:noFill/>
+        </p:spPr>
+        <p:txBody>
+          <a:bodyPr wrap="square">
+            <a:spAutoFit/>
+          </a:bodyPr>
+          <a:lstStyle/>
+          <a:p>
+            <a:pPr algn="ctr"/>
+            <a:r>
+              <a:rPr kumimoji="0" lang="en-US" sz="5400" b="0" i="0" u="none" strike="noStrike" kern="1200" cap="none" spc="0" normalizeH="0" baseline="0" noProof="0" dirty="0">
+                <a:ln>
+                  <a:noFill/>
+                </a:ln>
+                <a:solidFill>
+                  <a:prstClr val="black"/>
+                </a:solidFill>
+                <a:effectLst/>
+                <a:uLnTx/>
+                <a:uFillTx/>
+                <a:latin typeface="Calibri" panose="020F0502020204030204"/>
+                <a:ea typeface="+mn-ea"/>
+                <a:cs typeface="+mn-cs"/>
+              </a:rPr>
+              <a:t>🧬</a:t>
+            </a:r>
+            <a:endParaRPr lang="en-US" dirty="0"/>
+          </a:p>
+        </p:txBody>
+      </p:sp>
+      <p:sp>
+        <p:nvSpPr>
+          <p:cNvPr id="8" name="TextBox 7">
+            <a:extLst>
+              <a:ext uri="{FF2B5EF4-FFF2-40B4-BE49-F238E27FC236}">
+                <a16:creationId xmlns:a16="http://schemas.microsoft.com/office/drawing/2014/main" id="{E8BD7AEE-C953-475E-B413-B83CF0E75CAA}"/>
+              </a:ext>
+            </a:extLst>
+          </p:cNvPr>
+          <p:cNvSpPr txBox="1"/>
+          <p:nvPr/>
+        </p:nvSpPr>
+        <p:spPr>
+          <a:xfrm rot="20960246">
+            <a:off x="461654" y="2067677"/>
+            <a:ext cx="1272050" cy="923330"/>
+          </a:xfrm>
+          <a:prstGeom prst="rect">
+            <a:avLst/>
+          </a:prstGeom>
+          <a:noFill/>
+        </p:spPr>
+        <p:txBody>
+          <a:bodyPr wrap="square">
+            <a:spAutoFit/>
+          </a:bodyPr>
+          <a:lstStyle/>
+          <a:p>
+            <a:pPr algn="ctr"/>
+            <a:r>
+              <a:rPr kumimoji="0" lang="en-US" sz="5400" b="0" i="0" u="none" strike="noStrike" kern="1200" cap="none" spc="0" normalizeH="0" baseline="0" noProof="0" dirty="0">
+                <a:ln>
+                  <a:noFill/>
+                </a:ln>
+                <a:solidFill>
+                  <a:prstClr val="black"/>
+                </a:solidFill>
+                <a:effectLst/>
+                <a:uLnTx/>
+                <a:uFillTx/>
+                <a:latin typeface="Calibri" panose="020F0502020204030204"/>
+                <a:ea typeface="+mn-ea"/>
+                <a:cs typeface="+mn-cs"/>
+              </a:rPr>
+              <a:t>💾</a:t>
+            </a:r>
+          </a:p>
+        </p:txBody>
+      </p:sp>
+      <p:sp>
+        <p:nvSpPr>
+          <p:cNvPr id="9" name="Title 1">
+            <a:extLst>
+              <a:ext uri="{FF2B5EF4-FFF2-40B4-BE49-F238E27FC236}">
+                <a16:creationId xmlns:a16="http://schemas.microsoft.com/office/drawing/2014/main" id="{BEA639A3-D75D-4DA6-BF22-973400655E12}"/>
+              </a:ext>
+            </a:extLst>
+          </p:cNvPr>
+          <p:cNvSpPr txBox="1">
+            <a:spLocks/>
+          </p:cNvSpPr>
+          <p:nvPr/>
+        </p:nvSpPr>
+        <p:spPr>
+          <a:xfrm>
+            <a:off x="4874329" y="4587656"/>
+            <a:ext cx="2175400" cy="624757"/>
+          </a:xfrm>
+          <a:prstGeom prst="roundRect">
+            <a:avLst>
+              <a:gd name="adj" fmla="val 50000"/>
+            </a:avLst>
+          </a:prstGeom>
+          <a:solidFill>
+            <a:schemeClr val="bg1"/>
+          </a:solidFill>
+          <a:effectLst>
+            <a:outerShdw blurRad="50800" dist="38100" dir="8100000" algn="tr" rotWithShape="0">
+              <a:prstClr val="black">
+                <a:alpha val="40000"/>
+              </a:prstClr>
+            </a:outerShdw>
+          </a:effectLst>
+        </p:spPr>
+        <p:txBody>
+          <a:bodyPr wrap="square" lIns="0" tIns="108000" anchor="ctr" anchorCtr="0">
+            <a:normAutofit fontScale="40000" lnSpcReduction="20000"/>
+          </a:bodyPr>
+          <a:lstStyle>
+            <a:lvl1pPr algn="l" defTabSz="914400" rtl="0" eaLnBrk="1" latinLnBrk="0" hangingPunct="1">
+              <a:lnSpc>
+                <a:spcPct val="90000"/>
+              </a:lnSpc>
+              <a:spcBef>
+                <a:spcPct val="0"/>
+              </a:spcBef>
+              <a:buNone/>
+              <a:defRPr sz="4400" kern="1200">
+                <a:solidFill>
+                  <a:schemeClr val="tx1"/>
+                </a:solidFill>
+                <a:latin typeface="+mj-lt"/>
+                <a:ea typeface="+mj-ea"/>
+                <a:cs typeface="+mj-cs"/>
+              </a:defRPr>
+            </a:lvl1pPr>
+          </a:lstStyle>
+          <a:p>
+            <a:pPr algn="ctr"/>
+            <a:r>
+              <a:rPr lang="en-US" sz="6000" b="1" dirty="0">
+                <a:latin typeface="Space Mono" panose="02000509040000020004" charset="0"/>
+              </a:rPr>
+              <a:t>Demo</a:t>
+            </a:r>
+          </a:p>
+        </p:txBody>
+      </p:sp>
+    </p:spTree>
+    <p:extLst>
+      <p:ext uri="{BB962C8B-B14F-4D97-AF65-F5344CB8AC3E}">
+        <p14:creationId xmlns:p14="http://schemas.microsoft.com/office/powerpoint/2010/main" val="2846825204"/>
+      </p:ext>
+    </p:extLst>
+  </p:cSld>
+  <p:clrMapOvr>
+    <a:masterClrMapping/>
+  </p:clrMapOvr>
+  <mc:AlternateContent xmlns:mc="http://schemas.openxmlformats.org/markup-compatibility/2006">
+    <mc:Choice xmlns:p159="http://schemas.microsoft.com/office/powerpoint/2015/09/main" Requires="p159">
+      <p:transition xmlns:p14="http://schemas.microsoft.com/office/powerpoint/2010/main" spd="slow" p14:dur="1250">
+        <p159:morph option="byWord"/>
+      </p:transition>
+    </mc:Choice>
+    <mc:Fallback>
+      <p:transition spd="slow">
+        <p:fade/>
+      </p:transition>
+    </mc:Fallback>
+  </mc:AlternateContent>
+  <p:timing>
+    <p:tnLst>
+      <p:par>
+        <p:cTn id="1" dur="indefinite" restart="never" nodeType="tmRoot">
+          <p:childTnLst>
+            <p:seq concurrent="1" nextAc="seek">
+              <p:cTn id="2" dur="indefinite" nodeType="mainSeq">
+                <p:childTnLst>
+                  <p:par>
+                    <p:cTn id="3" fill="hold">
+                      <p:stCondLst>
+                        <p:cond delay="indefinite"/>
+                      </p:stCondLst>
+                      <p:childTnLst>
+                        <p:par>
+                          <p:cTn id="4" fill="hold">
+                            <p:stCondLst>
+                              <p:cond delay="0"/>
+                            </p:stCondLst>
+                            <p:childTnLst>
+                              <p:par>
+                                <p:cTn id="5" presetID="10" presetClass="entr" presetSubtype="0" fill="hold" grpId="0" nodeType="clickEffect">
+                                  <p:stCondLst>
+                                    <p:cond delay="0"/>
+                                  </p:stCondLst>
+                                  <p:childTnLst>
+                                    <p:set>
+                                      <p:cBhvr>
+                                        <p:cTn id="6" dur="1" fill="hold">
+                                          <p:stCondLst>
+                                            <p:cond delay="0"/>
+                                          </p:stCondLst>
+                                        </p:cTn>
+                                        <p:tgtEl>
+                                          <p:spTgt spid="3"/>
+                                        </p:tgtEl>
+                                        <p:attrNameLst>
+                                          <p:attrName>style.visibility</p:attrName>
+                                        </p:attrNameLst>
+                                      </p:cBhvr>
+                                      <p:to>
+                                        <p:strVal val="visible"/>
+                                      </p:to>
+                                    </p:set>
+                                    <p:animEffect transition="in" filter="fade">
+                                      <p:cBhvr>
+                                        <p:cTn id="7" dur="500"/>
+                                        <p:tgtEl>
+                                          <p:spTgt spid="3"/>
+                                        </p:tgtEl>
+                                      </p:cBhvr>
+                                    </p:animEffect>
+                                  </p:childTnLst>
+                                </p:cTn>
+                              </p:par>
+                            </p:childTnLst>
+                          </p:cTn>
+                        </p:par>
+                      </p:childTnLst>
+                    </p:cTn>
+                  </p:par>
+                  <p:par>
+                    <p:cTn id="8" fill="hold">
+                      <p:stCondLst>
+                        <p:cond delay="indefinite"/>
+                      </p:stCondLst>
+                      <p:childTnLst>
+                        <p:par>
+                          <p:cTn id="9" fill="hold">
+                            <p:stCondLst>
+                              <p:cond delay="0"/>
+                            </p:stCondLst>
+                            <p:childTnLst>
+                              <p:par>
+                                <p:cTn id="10" presetID="1" presetClass="entr" presetSubtype="0" fill="hold" grpId="0" nodeType="clickEffect">
+                                  <p:stCondLst>
+                                    <p:cond delay="0"/>
+                                  </p:stCondLst>
+                                  <p:childTnLst>
+                                    <p:set>
+                                      <p:cBhvr>
+                                        <p:cTn id="11" dur="1" fill="hold">
+                                          <p:stCondLst>
+                                            <p:cond delay="0"/>
+                                          </p:stCondLst>
+                                        </p:cTn>
+                                        <p:tgtEl>
+                                          <p:spTgt spid="7"/>
+                                        </p:tgtEl>
+                                        <p:attrNameLst>
+                                          <p:attrName>style.visibility</p:attrName>
+                                        </p:attrNameLst>
+                                      </p:cBhvr>
+                                      <p:to>
+                                        <p:strVal val="visible"/>
+                                      </p:to>
+                                    </p:set>
+                                  </p:childTnLst>
+                                </p:cTn>
+                              </p:par>
+                              <p:par>
+                                <p:cTn id="12" presetID="1" presetClass="entr" presetSubtype="0" fill="hold" grpId="0" nodeType="withEffect">
+                                  <p:stCondLst>
+                                    <p:cond delay="0"/>
+                                  </p:stCondLst>
+                                  <p:childTnLst>
+                                    <p:set>
+                                      <p:cBhvr>
+                                        <p:cTn id="13" dur="1" fill="hold">
+                                          <p:stCondLst>
+                                            <p:cond delay="0"/>
+                                          </p:stCondLst>
+                                        </p:cTn>
+                                        <p:tgtEl>
+                                          <p:spTgt spid="8"/>
+                                        </p:tgtEl>
+                                        <p:attrNameLst>
+                                          <p:attrName>style.visibility</p:attrName>
+                                        </p:attrNameLst>
+                                      </p:cBhvr>
+                                      <p:to>
+                                        <p:strVal val="visible"/>
+                                      </p:to>
+                                    </p:set>
+                                  </p:childTnLst>
+                                </p:cTn>
+                              </p:par>
+                            </p:childTnLst>
+                          </p:cTn>
+                        </p:par>
+                      </p:childTnLst>
+                    </p:cTn>
+                  </p:par>
+                  <p:par>
+                    <p:cTn id="14" fill="hold">
+                      <p:stCondLst>
+                        <p:cond delay="indefinite"/>
+                      </p:stCondLst>
+                      <p:childTnLst>
+                        <p:par>
+                          <p:cTn id="15" fill="hold">
+                            <p:stCondLst>
+                              <p:cond delay="0"/>
+                            </p:stCondLst>
+                            <p:childTnLst>
+                              <p:par>
+                                <p:cTn id="16" presetID="42" presetClass="entr" presetSubtype="0" fill="hold" grpId="0" nodeType="clickEffect">
+                                  <p:stCondLst>
+                                    <p:cond delay="0"/>
+                                  </p:stCondLst>
+                                  <p:childTnLst>
+                                    <p:set>
+                                      <p:cBhvr>
+                                        <p:cTn id="17" dur="1" fill="hold">
+                                          <p:stCondLst>
+                                            <p:cond delay="0"/>
+                                          </p:stCondLst>
+                                        </p:cTn>
+                                        <p:tgtEl>
+                                          <p:spTgt spid="9"/>
+                                        </p:tgtEl>
+                                        <p:attrNameLst>
+                                          <p:attrName>style.visibility</p:attrName>
+                                        </p:attrNameLst>
+                                      </p:cBhvr>
+                                      <p:to>
+                                        <p:strVal val="visible"/>
+                                      </p:to>
+                                    </p:set>
+                                    <p:animEffect transition="in" filter="fade">
+                                      <p:cBhvr>
+                                        <p:cTn id="18" dur="500"/>
+                                        <p:tgtEl>
+                                          <p:spTgt spid="9"/>
+                                        </p:tgtEl>
+                                      </p:cBhvr>
+                                    </p:animEffect>
+                                    <p:anim calcmode="lin" valueType="num">
+                                      <p:cBhvr>
+                                        <p:cTn id="19" dur="500" fill="hold"/>
+                                        <p:tgtEl>
+                                          <p:spTgt spid="9"/>
+                                        </p:tgtEl>
+                                        <p:attrNameLst>
+                                          <p:attrName>ppt_x</p:attrName>
+                                        </p:attrNameLst>
+                                      </p:cBhvr>
+                                      <p:tavLst>
+                                        <p:tav tm="0">
+                                          <p:val>
+                                            <p:strVal val="#ppt_x"/>
+                                          </p:val>
+                                        </p:tav>
+                                        <p:tav tm="100000">
+                                          <p:val>
+                                            <p:strVal val="#ppt_x"/>
+                                          </p:val>
+                                        </p:tav>
+                                      </p:tavLst>
+                                    </p:anim>
+                                    <p:anim calcmode="lin" valueType="num">
+                                      <p:cBhvr>
+                                        <p:cTn id="20" dur="500" fill="hold"/>
+                                        <p:tgtEl>
+                                          <p:spTgt spid="9"/>
+                                        </p:tgtEl>
+                                        <p:attrNameLst>
+                                          <p:attrName>ppt_y</p:attrName>
+                                        </p:attrNameLst>
+                                      </p:cBhvr>
+                                      <p:tavLst>
+                                        <p:tav tm="0">
+                                          <p:val>
+                                            <p:strVal val="#ppt_y+.1"/>
+                                          </p:val>
+                                        </p:tav>
+                                        <p:tav tm="100000">
+                                          <p:val>
+                                            <p:strVal val="#ppt_y"/>
+                                          </p:val>
+                                        </p:tav>
+                                      </p:tavLst>
+                                    </p:anim>
+                                  </p:childTnLst>
+                                </p:cTn>
+                              </p:par>
+                            </p:childTnLst>
+                          </p:cTn>
+                        </p:par>
+                      </p:childTnLst>
+                    </p:cTn>
+                  </p:par>
+                </p:childTnLst>
+              </p:cTn>
+              <p:prevCondLst>
+                <p:cond evt="onPrev" delay="0">
+                  <p:tgtEl>
+                    <p:sldTgt/>
+                  </p:tgtEl>
+                </p:cond>
+              </p:prevCondLst>
+              <p:nextCondLst>
+                <p:cond evt="onNext" delay="0">
+                  <p:tgtEl>
+                    <p:sldTgt/>
+                  </p:tgtEl>
+                </p:cond>
+              </p:nextCondLst>
+            </p:seq>
+          </p:childTnLst>
+        </p:cTn>
+      </p:par>
+    </p:tnLst>
+    <p:bldLst>
+      <p:bldP spid="3" grpId="0" animBg="1"/>
+      <p:bldP spid="7" grpId="0"/>
+      <p:bldP spid="8" grpId="0"/>
+      <p:bldP spid="9" grpId="0" animBg="1"/>
+    </p:bldLst>
+  </p:timing>
+</p:sld>
+</file>
+
+<file path=ppt/slides/slide14.xml><?xml version="1.0" encoding="utf-8"?>
+<p:sld xmlns:a="http://schemas.openxmlformats.org/drawingml/2006/main" xmlns:r="http://schemas.openxmlformats.org/officeDocument/2006/relationships" xmlns:p="http://schemas.openxmlformats.org/presentationml/2006/main">
+  <p:cSld>
+    <p:spTree>
+      <p:nvGrpSpPr>
+        <p:cNvPr id="1" name=""/>
+        <p:cNvGrpSpPr/>
+        <p:nvPr/>
+      </p:nvGrpSpPr>
+      <p:grpSpPr>
+        <a:xfrm>
+          <a:off x="0" y="0"/>
+          <a:ext cx="0" cy="0"/>
+          <a:chOff x="0" y="0"/>
+          <a:chExt cx="0" cy="0"/>
+        </a:xfrm>
+      </p:grpSpPr>
+      <p:sp>
+        <p:nvSpPr>
+          <p:cNvPr id="2" name="Title 1">
+            <a:extLst>
+              <a:ext uri="{FF2B5EF4-FFF2-40B4-BE49-F238E27FC236}">
+                <a16:creationId xmlns:a16="http://schemas.microsoft.com/office/drawing/2014/main" id="{61E96AB7-7EF3-4D5A-B933-1847BCA69001}"/>
+              </a:ext>
+            </a:extLst>
+          </p:cNvPr>
+          <p:cNvSpPr txBox="1">
+            <a:spLocks/>
+          </p:cNvSpPr>
+          <p:nvPr/>
+        </p:nvSpPr>
+        <p:spPr>
+          <a:xfrm>
+            <a:off x="615043" y="571374"/>
+            <a:ext cx="10961914" cy="1799318"/>
+          </a:xfrm>
+          <a:prstGeom prst="roundRect">
+            <a:avLst>
+              <a:gd name="adj" fmla="val 50000"/>
+            </a:avLst>
+          </a:prstGeom>
+          <a:solidFill>
+            <a:schemeClr val="bg1"/>
+          </a:solidFill>
+          <a:effectLst>
+            <a:outerShdw blurRad="50800" dist="38100" dir="8100000" algn="tr" rotWithShape="0">
+              <a:prstClr val="black">
+                <a:alpha val="40000"/>
+              </a:prstClr>
+            </a:outerShdw>
+          </a:effectLst>
+        </p:spPr>
+        <p:txBody>
+          <a:bodyPr wrap="square" lIns="0" tIns="108000" anchor="ctr" anchorCtr="0">
+            <a:normAutofit fontScale="85000" lnSpcReduction="10000"/>
+          </a:bodyPr>
+          <a:lstStyle>
+            <a:lvl1pPr algn="l" defTabSz="914400" rtl="0" eaLnBrk="1" latinLnBrk="0" hangingPunct="1">
+              <a:lnSpc>
+                <a:spcPct val="90000"/>
+              </a:lnSpc>
+              <a:spcBef>
+                <a:spcPct val="0"/>
+              </a:spcBef>
+              <a:buNone/>
+              <a:defRPr sz="4400" kern="1200">
+                <a:solidFill>
+                  <a:schemeClr val="tx1"/>
+                </a:solidFill>
+                <a:latin typeface="+mj-lt"/>
+                <a:ea typeface="+mj-ea"/>
+                <a:cs typeface="+mj-cs"/>
+              </a:defRPr>
+            </a:lvl1pPr>
+          </a:lstStyle>
+          <a:p>
+            <a:pPr algn="ctr"/>
+            <a:r>
+              <a:rPr lang="en-US" sz="6000" b="1" dirty="0">
+                <a:latin typeface="Space Mono" panose="02000509040000020004" charset="0"/>
+              </a:rPr>
+              <a:t>Applications of </a:t>
+            </a:r>
+            <a:r>
+              <a:rPr lang="en-US" sz="6000" b="1" dirty="0" err="1">
+                <a:latin typeface="Space Mono" panose="02000509040000020004" charset="0"/>
+              </a:rPr>
+              <a:t>Eertrees</a:t>
+            </a:r>
+            <a:endParaRPr lang="en-US" sz="6000" b="1" dirty="0">
+              <a:latin typeface="Space Mono" panose="02000509040000020004" charset="0"/>
+            </a:endParaRPr>
+          </a:p>
+        </p:txBody>
+      </p:sp>
+      <p:sp>
+        <p:nvSpPr>
+          <p:cNvPr id="3" name="TextBox 2">
+            <a:extLst>
+              <a:ext uri="{FF2B5EF4-FFF2-40B4-BE49-F238E27FC236}">
+                <a16:creationId xmlns:a16="http://schemas.microsoft.com/office/drawing/2014/main" id="{8119EB29-2131-4C70-A4DB-3E3CAB94E8E5}"/>
+              </a:ext>
+            </a:extLst>
+          </p:cNvPr>
+          <p:cNvSpPr txBox="1"/>
+          <p:nvPr/>
+        </p:nvSpPr>
+        <p:spPr>
+          <a:xfrm rot="20195153">
+            <a:off x="10320182" y="1909026"/>
+            <a:ext cx="1272050" cy="923330"/>
+          </a:xfrm>
+          <a:prstGeom prst="rect">
+            <a:avLst/>
+          </a:prstGeom>
+          <a:noFill/>
+        </p:spPr>
+        <p:txBody>
+          <a:bodyPr wrap="square">
+            <a:spAutoFit/>
+          </a:bodyPr>
+          <a:lstStyle/>
+          <a:p>
+            <a:pPr algn="ctr"/>
+            <a:r>
+              <a:rPr kumimoji="0" lang="en-US" sz="5400" b="0" i="0" u="none" strike="noStrike" kern="1200" cap="none" spc="0" normalizeH="0" baseline="0" noProof="0" dirty="0">
+                <a:ln>
+                  <a:noFill/>
+                </a:ln>
+                <a:solidFill>
+                  <a:prstClr val="black"/>
+                </a:solidFill>
+                <a:effectLst/>
+                <a:uLnTx/>
+                <a:uFillTx/>
+                <a:latin typeface="Calibri" panose="020F0502020204030204"/>
+                <a:ea typeface="+mn-ea"/>
+                <a:cs typeface="+mn-cs"/>
+              </a:rPr>
+              <a:t>🧬</a:t>
+            </a:r>
+            <a:endParaRPr lang="en-US" dirty="0"/>
+          </a:p>
+        </p:txBody>
+      </p:sp>
+      <p:sp>
+        <p:nvSpPr>
+          <p:cNvPr id="4" name="TextBox 3">
+            <a:extLst>
+              <a:ext uri="{FF2B5EF4-FFF2-40B4-BE49-F238E27FC236}">
+                <a16:creationId xmlns:a16="http://schemas.microsoft.com/office/drawing/2014/main" id="{76E69BC0-02AF-4AE1-8BA6-1BAF50B48CFC}"/>
+              </a:ext>
+            </a:extLst>
+          </p:cNvPr>
+          <p:cNvSpPr txBox="1"/>
+          <p:nvPr/>
+        </p:nvSpPr>
+        <p:spPr>
+          <a:xfrm rot="20960246">
+            <a:off x="461654" y="109709"/>
+            <a:ext cx="1272050" cy="923330"/>
+          </a:xfrm>
+          <a:prstGeom prst="rect">
+            <a:avLst/>
+          </a:prstGeom>
+          <a:noFill/>
+        </p:spPr>
+        <p:txBody>
+          <a:bodyPr wrap="square">
+            <a:spAutoFit/>
+          </a:bodyPr>
+          <a:lstStyle/>
+          <a:p>
+            <a:pPr algn="ctr"/>
+            <a:r>
+              <a:rPr kumimoji="0" lang="en-US" sz="5400" b="0" i="0" u="none" strike="noStrike" kern="1200" cap="none" spc="0" normalizeH="0" baseline="0" noProof="0" dirty="0">
+                <a:ln>
+                  <a:noFill/>
+                </a:ln>
+                <a:solidFill>
+                  <a:prstClr val="black"/>
+                </a:solidFill>
+                <a:effectLst/>
+                <a:uLnTx/>
+                <a:uFillTx/>
+                <a:latin typeface="Calibri" panose="020F0502020204030204"/>
+                <a:ea typeface="+mn-ea"/>
+                <a:cs typeface="+mn-cs"/>
+              </a:rPr>
+              <a:t>💾</a:t>
+            </a:r>
+          </a:p>
+        </p:txBody>
+      </p:sp>
+      <p:sp>
+        <p:nvSpPr>
+          <p:cNvPr id="5" name="TextBox 4">
+            <a:extLst>
+              <a:ext uri="{FF2B5EF4-FFF2-40B4-BE49-F238E27FC236}">
+                <a16:creationId xmlns:a16="http://schemas.microsoft.com/office/drawing/2014/main" id="{522D5073-A029-4C93-8CDE-0FEFBF2E7DA5}"/>
+              </a:ext>
+            </a:extLst>
+          </p:cNvPr>
+          <p:cNvSpPr txBox="1"/>
+          <p:nvPr/>
+        </p:nvSpPr>
+        <p:spPr>
+          <a:xfrm>
+            <a:off x="1403388" y="2673905"/>
+            <a:ext cx="7607877" cy="3785652"/>
+          </a:xfrm>
+          <a:prstGeom prst="rect">
+            <a:avLst/>
+          </a:prstGeom>
+          <a:noFill/>
+        </p:spPr>
+        <p:txBody>
+          <a:bodyPr wrap="square" rtlCol="0">
+            <a:spAutoFit/>
+          </a:bodyPr>
+          <a:lstStyle/>
+          <a:p>
+            <a:pPr marL="442913" indent="-442913"/>
+            <a:r>
+              <a:rPr lang="en-US" sz="2400" b="1" dirty="0">
+                <a:latin typeface="Quicksand" charset="0"/>
+              </a:rPr>
+              <a:t>DNA Sequencing:</a:t>
+            </a:r>
+          </a:p>
+          <a:p>
+            <a:pPr marL="354013" indent="-354013">
+              <a:buFont typeface="Arial" panose="020B0604020202020204" pitchFamily="34" charset="0"/>
+              <a:buChar char="•"/>
+            </a:pPr>
+            <a:r>
+              <a:rPr lang="en-US" sz="2400" dirty="0">
+                <a:latin typeface="Quicksand" charset="0"/>
+              </a:rPr>
+              <a:t>A,C,G,T</a:t>
+            </a:r>
+          </a:p>
+          <a:p>
+            <a:pPr marL="354013" indent="-354013">
+              <a:buFont typeface="Arial" panose="020B0604020202020204" pitchFamily="34" charset="0"/>
+              <a:buChar char="•"/>
+            </a:pPr>
+            <a:r>
+              <a:rPr lang="en-US" sz="2400" dirty="0">
+                <a:latin typeface="Quicksand" charset="0"/>
+              </a:rPr>
+              <a:t>Restriction Enzymes</a:t>
+            </a:r>
+          </a:p>
+          <a:p>
+            <a:pPr marL="354013" indent="-354013">
+              <a:buFont typeface="Arial" panose="020B0604020202020204" pitchFamily="34" charset="0"/>
+              <a:buChar char="•"/>
+            </a:pPr>
+            <a:r>
+              <a:rPr lang="en-US" sz="2400" dirty="0">
+                <a:latin typeface="Quicksand" charset="0"/>
+              </a:rPr>
+              <a:t>Palindrome similarity</a:t>
+            </a:r>
+          </a:p>
+          <a:p>
+            <a:pPr marL="354013" indent="-354013">
+              <a:buFont typeface="Arial" panose="020B0604020202020204" pitchFamily="34" charset="0"/>
+              <a:buChar char="•"/>
+            </a:pPr>
+            <a:r>
+              <a:rPr lang="en-US" sz="2400" dirty="0">
+                <a:latin typeface="Quicksand" charset="0"/>
+              </a:rPr>
+              <a:t>Instability of palindromes (helps predict cancer risk, diagnose weaknesses etc.)</a:t>
+            </a:r>
+          </a:p>
+          <a:p>
+            <a:r>
+              <a:rPr lang="en-US" sz="2400" b="1" dirty="0">
+                <a:latin typeface="Quicksand" charset="0"/>
+              </a:rPr>
+              <a:t>Information Retrieval:</a:t>
+            </a:r>
+          </a:p>
+          <a:p>
+            <a:pPr marL="342900" indent="-342900">
+              <a:buFont typeface="Arial" panose="020B0604020202020204" pitchFamily="34" charset="0"/>
+              <a:buChar char="•"/>
+            </a:pPr>
+            <a:r>
+              <a:rPr lang="en-US" sz="2400" dirty="0">
+                <a:latin typeface="Quicksand" charset="0"/>
+              </a:rPr>
+              <a:t>SUS problems</a:t>
+            </a:r>
+          </a:p>
+          <a:p>
+            <a:pPr marL="342900" indent="-342900">
+              <a:buFont typeface="Arial" panose="020B0604020202020204" pitchFamily="34" charset="0"/>
+              <a:buChar char="•"/>
+            </a:pPr>
+            <a:endParaRPr lang="en-US" sz="2400" dirty="0">
+              <a:latin typeface="Quicksand" charset="0"/>
+            </a:endParaRPr>
+          </a:p>
+          <a:p>
+            <a:pPr marL="354013" indent="-354013">
+              <a:buFont typeface="Arial" panose="020B0604020202020204" pitchFamily="34" charset="0"/>
+              <a:buChar char="•"/>
+            </a:pPr>
+            <a:endParaRPr lang="en-US" sz="2400" dirty="0">
+              <a:latin typeface="Quicksand" charset="0"/>
+            </a:endParaRPr>
+          </a:p>
+        </p:txBody>
+      </p:sp>
+    </p:spTree>
+    <p:extLst>
+      <p:ext uri="{BB962C8B-B14F-4D97-AF65-F5344CB8AC3E}">
+        <p14:creationId xmlns:p14="http://schemas.microsoft.com/office/powerpoint/2010/main" val="3115066087"/>
+      </p:ext>
+    </p:extLst>
+  </p:cSld>
+  <p:clrMapOvr>
+    <a:masterClrMapping/>
+  </p:clrMapOvr>
+  <p:timing>
+    <p:tnLst>
+      <p:par>
+        <p:cTn id="1" dur="indefinite" restart="never" nodeType="tmRoot">
+          <p:childTnLst>
+            <p:seq concurrent="1" nextAc="seek">
+              <p:cTn id="2" dur="indefinite" nodeType="mainSeq">
+                <p:childTnLst>
+                  <p:par>
+                    <p:cTn id="3" fill="hold">
+                      <p:stCondLst>
+                        <p:cond delay="indefinite"/>
+                      </p:stCondLst>
+                      <p:childTnLst>
+                        <p:par>
+                          <p:cTn id="4" fill="hold">
+                            <p:stCondLst>
+                              <p:cond delay="0"/>
+                            </p:stCondLst>
+                            <p:childTnLst>
+                              <p:par>
+                                <p:cTn id="5" presetID="1" presetClass="entr" presetSubtype="0" fill="hold" nodeType="clickEffect">
+                                  <p:stCondLst>
+                                    <p:cond delay="0"/>
+                                  </p:stCondLst>
+                                  <p:childTnLst>
+                                    <p:set>
+                                      <p:cBhvr>
+                                        <p:cTn id="6" dur="1" fill="hold">
+                                          <p:stCondLst>
+                                            <p:cond delay="0"/>
+                                          </p:stCondLst>
+                                        </p:cTn>
+                                        <p:tgtEl>
+                                          <p:spTgt spid="5">
+                                            <p:txEl>
+                                              <p:pRg st="0" end="0"/>
+                                            </p:txEl>
+                                          </p:spTgt>
+                                        </p:tgtEl>
+                                        <p:attrNameLst>
+                                          <p:attrName>style.visibility</p:attrName>
+                                        </p:attrNameLst>
+                                      </p:cBhvr>
+                                      <p:to>
+                                        <p:strVal val="visible"/>
+                                      </p:to>
+                                    </p:set>
+                                  </p:childTnLst>
+                                </p:cTn>
+                              </p:par>
+                            </p:childTnLst>
+                          </p:cTn>
+                        </p:par>
+                      </p:childTnLst>
+                    </p:cTn>
+                  </p:par>
+                  <p:par>
+                    <p:cTn id="7" fill="hold">
+                      <p:stCondLst>
+                        <p:cond delay="indefinite"/>
+                      </p:stCondLst>
+                      <p:childTnLst>
+                        <p:par>
+                          <p:cTn id="8" fill="hold">
+                            <p:stCondLst>
+                              <p:cond delay="0"/>
+                            </p:stCondLst>
+                            <p:childTnLst>
+                              <p:par>
+                                <p:cTn id="9" presetID="1" presetClass="entr" presetSubtype="0" fill="hold" nodeType="clickEffect">
+                                  <p:stCondLst>
+                                    <p:cond delay="0"/>
+                                  </p:stCondLst>
+                                  <p:childTnLst>
+                                    <p:set>
+                                      <p:cBhvr>
+                                        <p:cTn id="10" dur="1" fill="hold">
+                                          <p:stCondLst>
+                                            <p:cond delay="0"/>
+                                          </p:stCondLst>
+                                        </p:cTn>
+                                        <p:tgtEl>
+                                          <p:spTgt spid="5">
+                                            <p:txEl>
+                                              <p:pRg st="1" end="1"/>
+                                            </p:txEl>
+                                          </p:spTgt>
+                                        </p:tgtEl>
+                                        <p:attrNameLst>
+                                          <p:attrName>style.visibility</p:attrName>
+                                        </p:attrNameLst>
+                                      </p:cBhvr>
+                                      <p:to>
+                                        <p:strVal val="visible"/>
+                                      </p:to>
+                                    </p:set>
+                                  </p:childTnLst>
+                                </p:cTn>
+                              </p:par>
+                            </p:childTnLst>
+                          </p:cTn>
+                        </p:par>
+                      </p:childTnLst>
+                    </p:cTn>
+                  </p:par>
+                  <p:par>
+                    <p:cTn id="11" fill="hold">
+                      <p:stCondLst>
+                        <p:cond delay="indefinite"/>
+                      </p:stCondLst>
+                      <p:childTnLst>
+                        <p:par>
+                          <p:cTn id="12" fill="hold">
+                            <p:stCondLst>
+                              <p:cond delay="0"/>
+                            </p:stCondLst>
+                            <p:childTnLst>
+                              <p:par>
+                                <p:cTn id="13" presetID="1" presetClass="entr" presetSubtype="0" fill="hold" nodeType="clickEffect">
+                                  <p:stCondLst>
+                                    <p:cond delay="0"/>
+                                  </p:stCondLst>
+                                  <p:childTnLst>
+                                    <p:set>
+                                      <p:cBhvr>
+                                        <p:cTn id="14" dur="1" fill="hold">
+                                          <p:stCondLst>
+                                            <p:cond delay="0"/>
+                                          </p:stCondLst>
+                                        </p:cTn>
+                                        <p:tgtEl>
+                                          <p:spTgt spid="5">
+                                            <p:txEl>
+                                              <p:pRg st="2" end="2"/>
+                                            </p:txEl>
+                                          </p:spTgt>
+                                        </p:tgtEl>
+                                        <p:attrNameLst>
+                                          <p:attrName>style.visibility</p:attrName>
+                                        </p:attrNameLst>
+                                      </p:cBhvr>
+                                      <p:to>
+                                        <p:strVal val="visible"/>
+                                      </p:to>
+                                    </p:set>
+                                  </p:childTnLst>
+                                </p:cTn>
+                              </p:par>
+                            </p:childTnLst>
+                          </p:cTn>
+                        </p:par>
+                      </p:childTnLst>
+                    </p:cTn>
+                  </p:par>
+                  <p:par>
+                    <p:cTn id="15" fill="hold">
+                      <p:stCondLst>
+                        <p:cond delay="indefinite"/>
+                      </p:stCondLst>
+                      <p:childTnLst>
+                        <p:par>
+                          <p:cTn id="16" fill="hold">
+                            <p:stCondLst>
+                              <p:cond delay="0"/>
+                            </p:stCondLst>
+                            <p:childTnLst>
+                              <p:par>
+                                <p:cTn id="17" presetID="1" presetClass="entr" presetSubtype="0" fill="hold" nodeType="clickEffect">
+                                  <p:stCondLst>
+                                    <p:cond delay="0"/>
+                                  </p:stCondLst>
+                                  <p:childTnLst>
+                                    <p:set>
+                                      <p:cBhvr>
+                                        <p:cTn id="18" dur="1" fill="hold">
+                                          <p:stCondLst>
+                                            <p:cond delay="0"/>
+                                          </p:stCondLst>
+                                        </p:cTn>
+                                        <p:tgtEl>
+                                          <p:spTgt spid="5">
+                                            <p:txEl>
+                                              <p:pRg st="3" end="3"/>
+                                            </p:txEl>
+                                          </p:spTgt>
+                                        </p:tgtEl>
+                                        <p:attrNameLst>
+                                          <p:attrName>style.visibility</p:attrName>
+                                        </p:attrNameLst>
+                                      </p:cBhvr>
+                                      <p:to>
+                                        <p:strVal val="visible"/>
+                                      </p:to>
+                                    </p:set>
+                                  </p:childTnLst>
+                                </p:cTn>
+                              </p:par>
+                            </p:childTnLst>
+                          </p:cTn>
+                        </p:par>
+                      </p:childTnLst>
+                    </p:cTn>
+                  </p:par>
+                  <p:par>
+                    <p:cTn id="19" fill="hold">
+                      <p:stCondLst>
+                        <p:cond delay="indefinite"/>
+                      </p:stCondLst>
+                      <p:childTnLst>
+                        <p:par>
+                          <p:cTn id="20" fill="hold">
+                            <p:stCondLst>
+                              <p:cond delay="0"/>
+                            </p:stCondLst>
+                            <p:childTnLst>
+                              <p:par>
+                                <p:cTn id="21" presetID="1" presetClass="entr" presetSubtype="0" fill="hold" nodeType="clickEffect">
+                                  <p:stCondLst>
+                                    <p:cond delay="0"/>
+                                  </p:stCondLst>
+                                  <p:childTnLst>
+                                    <p:set>
+                                      <p:cBhvr>
+                                        <p:cTn id="22" dur="1" fill="hold">
+                                          <p:stCondLst>
+                                            <p:cond delay="0"/>
+                                          </p:stCondLst>
+                                        </p:cTn>
+                                        <p:tgtEl>
+                                          <p:spTgt spid="5">
+                                            <p:txEl>
+                                              <p:pRg st="4" end="4"/>
+                                            </p:txEl>
+                                          </p:spTgt>
+                                        </p:tgtEl>
+                                        <p:attrNameLst>
+                                          <p:attrName>style.visibility</p:attrName>
+                                        </p:attrNameLst>
+                                      </p:cBhvr>
+                                      <p:to>
+                                        <p:strVal val="visible"/>
+                                      </p:to>
+                                    </p:set>
+                                  </p:childTnLst>
+                                </p:cTn>
+                              </p:par>
+                            </p:childTnLst>
+                          </p:cTn>
+                        </p:par>
+                      </p:childTnLst>
+                    </p:cTn>
+                  </p:par>
+                  <p:par>
+                    <p:cTn id="23" fill="hold">
+                      <p:stCondLst>
+                        <p:cond delay="indefinite"/>
+                      </p:stCondLst>
+                      <p:childTnLst>
+                        <p:par>
+                          <p:cTn id="24" fill="hold">
+                            <p:stCondLst>
+                              <p:cond delay="0"/>
+                            </p:stCondLst>
+                            <p:childTnLst>
+                              <p:par>
+                                <p:cTn id="25" presetID="1" presetClass="entr" presetSubtype="0" fill="hold" nodeType="clickEffect">
+                                  <p:stCondLst>
+                                    <p:cond delay="0"/>
+                                  </p:stCondLst>
+                                  <p:childTnLst>
+                                    <p:set>
+                                      <p:cBhvr>
+                                        <p:cTn id="26" dur="1" fill="hold">
+                                          <p:stCondLst>
+                                            <p:cond delay="0"/>
+                                          </p:stCondLst>
+                                        </p:cTn>
+                                        <p:tgtEl>
+                                          <p:spTgt spid="5">
+                                            <p:txEl>
+                                              <p:pRg st="5" end="5"/>
+                                            </p:txEl>
+                                          </p:spTgt>
+                                        </p:tgtEl>
+                                        <p:attrNameLst>
+                                          <p:attrName>style.visibility</p:attrName>
+                                        </p:attrNameLst>
+                                      </p:cBhvr>
+                                      <p:to>
+                                        <p:strVal val="visible"/>
+                                      </p:to>
+                                    </p:set>
+                                  </p:childTnLst>
+                                </p:cTn>
+                              </p:par>
+                            </p:childTnLst>
+                          </p:cTn>
+                        </p:par>
+                      </p:childTnLst>
+                    </p:cTn>
+                  </p:par>
+                  <p:par>
+                    <p:cTn id="27" fill="hold">
+                      <p:stCondLst>
+                        <p:cond delay="indefinite"/>
+                      </p:stCondLst>
+                      <p:childTnLst>
+                        <p:par>
+                          <p:cTn id="28" fill="hold">
+                            <p:stCondLst>
+                              <p:cond delay="0"/>
+                            </p:stCondLst>
+                            <p:childTnLst>
+                              <p:par>
+                                <p:cTn id="29" presetID="1" presetClass="entr" presetSubtype="0" fill="hold" nodeType="clickEffect">
+                                  <p:stCondLst>
+                                    <p:cond delay="0"/>
+                                  </p:stCondLst>
+                                  <p:childTnLst>
+                                    <p:set>
+                                      <p:cBhvr>
+                                        <p:cTn id="30" dur="1" fill="hold">
+                                          <p:stCondLst>
+                                            <p:cond delay="0"/>
+                                          </p:stCondLst>
+                                        </p:cTn>
+                                        <p:tgtEl>
+                                          <p:spTgt spid="5">
+                                            <p:txEl>
+                                              <p:pRg st="6" end="6"/>
+                                            </p:txEl>
+                                          </p:spTgt>
+                                        </p:tgtEl>
+                                        <p:attrNameLst>
+                                          <p:attrName>style.visibility</p:attrName>
+                                        </p:attrNameLst>
+                                      </p:cBhvr>
+                                      <p:to>
+                                        <p:strVal val="visible"/>
+                                      </p:to>
+                                    </p:set>
+                                  </p:childTnLst>
+                                </p:cTn>
+                              </p:par>
+                            </p:childTnLst>
+                          </p:cTn>
+                        </p:par>
+                      </p:childTnLst>
+                    </p:cTn>
+                  </p:par>
+                </p:childTnLst>
+              </p:cTn>
+              <p:prevCondLst>
+                <p:cond evt="onPrev" delay="0">
+                  <p:tgtEl>
+                    <p:sldTgt/>
+                  </p:tgtEl>
+                </p:cond>
+              </p:prevCondLst>
+              <p:nextCondLst>
+                <p:cond evt="onNext" delay="0">
+                  <p:tgtEl>
+                    <p:sldTgt/>
+                  </p:tgtEl>
+                </p:cond>
+              </p:nextCondLst>
+            </p:seq>
+          </p:childTnLst>
+        </p:cTn>
+      </p:par>
+    </p:tnLst>
+  </p:timing>
 </p:sld>
 </file>
 
@@ -47201,12 +49414,16 @@
                         </a:spcAft>
                       </a:pPr>
                       <a:r>
-                        <a:rPr lang="en-US" sz="1400">
+                        <a:rPr lang="en-US" sz="1400" dirty="0" err="1">
                           <a:effectLst/>
                           <a:latin typeface="Quicksand Medium" charset="0"/>
                         </a:rPr>
                         <a:t>Eertree</a:t>
                       </a:r>
+                      <a:endParaRPr lang="en-US" sz="1400" dirty="0">
+                        <a:effectLst/>
+                        <a:latin typeface="Quicksand Medium" charset="0"/>
+                      </a:endParaRPr>
                     </a:p>
                   </a:txBody>
                   <a:tcPr marL="50800" marR="50800" marT="50800" marB="50800">
@@ -49109,13 +51326,13 @@
   <p:clrMapOvr>
     <a:masterClrMapping/>
   </p:clrMapOvr>
-  <mc:AlternateContent xmlns:mc="http://schemas.openxmlformats.org/markup-compatibility/2006">
-    <mc:Choice xmlns:p159="http://schemas.microsoft.com/office/powerpoint/2015/09/main" Requires="p159">
+  <mc:AlternateContent xmlns:mc="http://schemas.openxmlformats.org/markup-compatibility/2006" xmlns:p159="http://schemas.microsoft.com/office/powerpoint/2015/09/main">
+    <mc:Choice Requires="p159">
       <p:transition xmlns:p14="http://schemas.microsoft.com/office/powerpoint/2010/main" spd="slow" p14:dur="2000">
         <p159:morph option="byObject"/>
       </p:transition>
     </mc:Choice>
-    <mc:Fallback>
+    <mc:Fallback xmlns="">
       <p:transition spd="slow">
         <p:fade/>
       </p:transition>
@@ -49183,7 +51400,273 @@
             <a:schemeClr val="bg1"/>
           </a:solidFill>
           <a:effectLst>
-            <a:outerShdw blurRad="63500" sx="102000" sy="102000" algn="ctr" rotWithShape="0">
+            <a:outerShdw blurRad="50800" dist="38100" dir="8100000" algn="tr" rotWithShape="0">
+              <a:prstClr val="black">
+                <a:alpha val="40000"/>
+              </a:prstClr>
+            </a:outerShdw>
+          </a:effectLst>
+        </p:spPr>
+        <p:txBody>
+          <a:bodyPr wrap="square" lIns="0" tIns="108000" anchor="ctr" anchorCtr="0">
+            <a:normAutofit/>
+          </a:bodyPr>
+          <a:lstStyle>
+            <a:lvl1pPr algn="l" defTabSz="914400" rtl="0" eaLnBrk="1" latinLnBrk="0" hangingPunct="1">
+              <a:lnSpc>
+                <a:spcPct val="90000"/>
+              </a:lnSpc>
+              <a:spcBef>
+                <a:spcPct val="0"/>
+              </a:spcBef>
+              <a:buNone/>
+              <a:defRPr sz="4400" kern="1200">
+                <a:solidFill>
+                  <a:schemeClr val="tx1"/>
+                </a:solidFill>
+                <a:latin typeface="+mj-lt"/>
+                <a:ea typeface="+mj-ea"/>
+                <a:cs typeface="+mj-cs"/>
+              </a:defRPr>
+            </a:lvl1pPr>
+          </a:lstStyle>
+          <a:p>
+            <a:pPr algn="ctr"/>
+            <a:r>
+              <a:rPr lang="en-US" sz="6000" b="1" dirty="0">
+                <a:latin typeface="Space Mono" panose="02000509040000020004" charset="0"/>
+              </a:rPr>
+              <a:t>What is a palindrome?</a:t>
+            </a:r>
+          </a:p>
+        </p:txBody>
+      </p:sp>
+      <p:sp>
+        <p:nvSpPr>
+          <p:cNvPr id="5" name="TextBox 4">
+            <a:extLst>
+              <a:ext uri="{FF2B5EF4-FFF2-40B4-BE49-F238E27FC236}">
+                <a16:creationId xmlns:a16="http://schemas.microsoft.com/office/drawing/2014/main" id="{DCABB39E-3BEB-422D-9166-69FFFB268BBD}"/>
+              </a:ext>
+            </a:extLst>
+          </p:cNvPr>
+          <p:cNvSpPr txBox="1"/>
+          <p:nvPr/>
+        </p:nvSpPr>
+        <p:spPr>
+          <a:xfrm rot="20601671">
+            <a:off x="1251964" y="5516200"/>
+            <a:ext cx="2183379" cy="584775"/>
+          </a:xfrm>
+          <a:prstGeom prst="rect">
+            <a:avLst/>
+          </a:prstGeom>
+          <a:noFill/>
+        </p:spPr>
+        <p:txBody>
+          <a:bodyPr wrap="square">
+            <a:spAutoFit/>
+          </a:bodyPr>
+          <a:lstStyle/>
+          <a:p>
+            <a:pPr algn="ctr"/>
+            <a:r>
+              <a:rPr lang="en-US" sz="3200" b="1" dirty="0">
+                <a:latin typeface="Space Mono" panose="02000509040000020004" charset="0"/>
+              </a:rPr>
+              <a:t>racecar</a:t>
+            </a:r>
+          </a:p>
+        </p:txBody>
+      </p:sp>
+      <p:sp>
+        <p:nvSpPr>
+          <p:cNvPr id="6" name="TextBox 5">
+            <a:extLst>
+              <a:ext uri="{FF2B5EF4-FFF2-40B4-BE49-F238E27FC236}">
+                <a16:creationId xmlns:a16="http://schemas.microsoft.com/office/drawing/2014/main" id="{0F20B403-C6B5-4884-8403-E338EB087224}"/>
+              </a:ext>
+            </a:extLst>
+          </p:cNvPr>
+          <p:cNvSpPr txBox="1"/>
+          <p:nvPr/>
+        </p:nvSpPr>
+        <p:spPr>
+          <a:xfrm rot="1264510">
+            <a:off x="5293066" y="1217287"/>
+            <a:ext cx="2183379" cy="584775"/>
+          </a:xfrm>
+          <a:prstGeom prst="rect">
+            <a:avLst/>
+          </a:prstGeom>
+          <a:noFill/>
+        </p:spPr>
+        <p:txBody>
+          <a:bodyPr wrap="square">
+            <a:spAutoFit/>
+          </a:bodyPr>
+          <a:lstStyle/>
+          <a:p>
+            <a:pPr algn="ctr"/>
+            <a:r>
+              <a:rPr lang="en-US" sz="3200" b="1" dirty="0">
+                <a:latin typeface="Space Mono" panose="02000509040000020004" charset="0"/>
+              </a:rPr>
+              <a:t>1991</a:t>
+            </a:r>
+          </a:p>
+        </p:txBody>
+      </p:sp>
+      <p:sp>
+        <p:nvSpPr>
+          <p:cNvPr id="7" name="TextBox 6">
+            <a:extLst>
+              <a:ext uri="{FF2B5EF4-FFF2-40B4-BE49-F238E27FC236}">
+                <a16:creationId xmlns:a16="http://schemas.microsoft.com/office/drawing/2014/main" id="{E13D9368-8851-476B-9DF1-AEA5E26E58C5}"/>
+              </a:ext>
+            </a:extLst>
+          </p:cNvPr>
+          <p:cNvSpPr txBox="1"/>
+          <p:nvPr/>
+        </p:nvSpPr>
+        <p:spPr>
+          <a:xfrm rot="1155333">
+            <a:off x="8589149" y="1155844"/>
+            <a:ext cx="2733957" cy="584775"/>
+          </a:xfrm>
+          <a:prstGeom prst="rect">
+            <a:avLst/>
+          </a:prstGeom>
+          <a:noFill/>
+        </p:spPr>
+        <p:txBody>
+          <a:bodyPr wrap="square">
+            <a:spAutoFit/>
+          </a:bodyPr>
+          <a:lstStyle/>
+          <a:p>
+            <a:pPr algn="ctr"/>
+            <a:r>
+              <a:rPr lang="en-US" sz="3200" b="1" dirty="0">
+                <a:latin typeface="Space Mono" panose="02000509040000020004" charset="0"/>
+              </a:rPr>
+              <a:t>AGTCXCTGA</a:t>
+            </a:r>
+          </a:p>
+        </p:txBody>
+      </p:sp>
+      <p:sp>
+        <p:nvSpPr>
+          <p:cNvPr id="9" name="TextBox 8">
+            <a:extLst>
+              <a:ext uri="{FF2B5EF4-FFF2-40B4-BE49-F238E27FC236}">
+                <a16:creationId xmlns:a16="http://schemas.microsoft.com/office/drawing/2014/main" id="{D9433CA3-27E3-4DA4-9C83-B90C6C9963F2}"/>
+              </a:ext>
+            </a:extLst>
+          </p:cNvPr>
+          <p:cNvSpPr txBox="1"/>
+          <p:nvPr/>
+        </p:nvSpPr>
+        <p:spPr>
+          <a:xfrm>
+            <a:off x="4641272" y="5292484"/>
+            <a:ext cx="4077375" cy="1015663"/>
+          </a:xfrm>
+          <a:prstGeom prst="rect">
+            <a:avLst/>
+          </a:prstGeom>
+          <a:noFill/>
+        </p:spPr>
+        <p:txBody>
+          <a:bodyPr wrap="square">
+            <a:spAutoFit/>
+          </a:bodyPr>
+          <a:lstStyle/>
+          <a:p>
+            <a:pPr algn="ctr"/>
+            <a:r>
+              <a:rPr lang="en-US" sz="6000" b="1" dirty="0" err="1">
+                <a:latin typeface="Space Mono" panose="02000509040000020004" charset="0"/>
+              </a:rPr>
+              <a:t>eertree</a:t>
+            </a:r>
+            <a:endParaRPr lang="en-US" sz="4000" dirty="0"/>
+          </a:p>
+        </p:txBody>
+      </p:sp>
+    </p:spTree>
+    <p:extLst>
+      <p:ext uri="{BB962C8B-B14F-4D97-AF65-F5344CB8AC3E}">
+        <p14:creationId xmlns:p14="http://schemas.microsoft.com/office/powerpoint/2010/main" val="12226323"/>
+      </p:ext>
+    </p:extLst>
+  </p:cSld>
+  <p:clrMapOvr>
+    <a:masterClrMapping/>
+  </p:clrMapOvr>
+</p:sld>
+</file>
+
+<file path=ppt/slides/slide7.xml><?xml version="1.0" encoding="utf-8"?>
+<p:sld xmlns:a="http://schemas.openxmlformats.org/drawingml/2006/main" xmlns:r="http://schemas.openxmlformats.org/officeDocument/2006/relationships" xmlns:p="http://schemas.openxmlformats.org/presentationml/2006/main">
+  <p:cSld>
+    <p:bg>
+      <p:bgPr>
+        <a:blipFill dpi="0" rotWithShape="1">
+          <a:blip r:embed="rId2">
+            <a:lum/>
+          </a:blip>
+          <a:srcRect/>
+          <a:stretch>
+            <a:fillRect/>
+          </a:stretch>
+        </a:blipFill>
+        <a:effectLst/>
+      </p:bgPr>
+    </p:bg>
+    <p:spTree>
+      <p:nvGrpSpPr>
+        <p:cNvPr id="1" name=""/>
+        <p:cNvGrpSpPr/>
+        <p:nvPr/>
+      </p:nvGrpSpPr>
+      <p:grpSpPr>
+        <a:xfrm>
+          <a:off x="0" y="0"/>
+          <a:ext cx="0" cy="0"/>
+          <a:chOff x="0" y="0"/>
+          <a:chExt cx="0" cy="0"/>
+        </a:xfrm>
+      </p:grpSpPr>
+      <p:sp>
+        <p:nvSpPr>
+          <p:cNvPr id="3" name="Title 1">
+            <a:extLst>
+              <a:ext uri="{FF2B5EF4-FFF2-40B4-BE49-F238E27FC236}">
+                <a16:creationId xmlns:a16="http://schemas.microsoft.com/office/drawing/2014/main" id="{143D2B39-9F82-430B-97BC-DDD9D97D02E7}"/>
+              </a:ext>
+            </a:extLst>
+          </p:cNvPr>
+          <p:cNvSpPr txBox="1">
+            <a:spLocks/>
+          </p:cNvSpPr>
+          <p:nvPr/>
+        </p:nvSpPr>
+        <p:spPr>
+          <a:xfrm>
+            <a:off x="615043" y="2529341"/>
+            <a:ext cx="10961914" cy="1799318"/>
+          </a:xfrm>
+          <a:prstGeom prst="roundRect">
+            <a:avLst>
+              <a:gd name="adj" fmla="val 50000"/>
+            </a:avLst>
+          </a:prstGeom>
+          <a:solidFill>
+            <a:schemeClr val="bg1"/>
+          </a:solidFill>
+          <a:effectLst>
+            <a:outerShdw blurRad="50800" dist="38100" dir="8100000" algn="tr" rotWithShape="0">
               <a:prstClr val="black">
                 <a:alpha val="40000"/>
               </a:prstClr>
@@ -49225,13 +51708,97 @@
               <a:rPr lang="en-US" sz="6000" b="1" dirty="0" err="1">
                 <a:latin typeface="Space Mono" panose="02000509040000020004" charset="0"/>
               </a:rPr>
-              <a:t>Eertree</a:t>
+              <a:t>eertree</a:t>
             </a:r>
             <a:r>
               <a:rPr lang="en-US" sz="6000" b="1" dirty="0">
                 <a:latin typeface="Space Mono" panose="02000509040000020004" charset="0"/>
               </a:rPr>
               <a:t>?</a:t>
+            </a:r>
+          </a:p>
+        </p:txBody>
+      </p:sp>
+      <p:sp>
+        <p:nvSpPr>
+          <p:cNvPr id="4" name="TextBox 3">
+            <a:extLst>
+              <a:ext uri="{FF2B5EF4-FFF2-40B4-BE49-F238E27FC236}">
+                <a16:creationId xmlns:a16="http://schemas.microsoft.com/office/drawing/2014/main" id="{5D538C93-2F5C-472F-8A46-A004C8B54BB8}"/>
+              </a:ext>
+            </a:extLst>
+          </p:cNvPr>
+          <p:cNvSpPr txBox="1"/>
+          <p:nvPr/>
+        </p:nvSpPr>
+        <p:spPr>
+          <a:xfrm rot="21269864">
+            <a:off x="787369" y="4932930"/>
+            <a:ext cx="3860188" cy="1077218"/>
+          </a:xfrm>
+          <a:prstGeom prst="rect">
+            <a:avLst/>
+          </a:prstGeom>
+          <a:noFill/>
+        </p:spPr>
+        <p:txBody>
+          <a:bodyPr wrap="square">
+            <a:spAutoFit/>
+          </a:bodyPr>
+          <a:lstStyle/>
+          <a:p>
+            <a:pPr algn="ctr"/>
+            <a:r>
+              <a:rPr lang="en-US" sz="3200" b="1" dirty="0">
+                <a:latin typeface="Space Mono" panose="02000509040000020004" charset="0"/>
+              </a:rPr>
+              <a:t>Palindromic substrings</a:t>
+            </a:r>
+          </a:p>
+        </p:txBody>
+      </p:sp>
+      <p:sp>
+        <p:nvSpPr>
+          <p:cNvPr id="6" name="TextBox 5">
+            <a:extLst>
+              <a:ext uri="{FF2B5EF4-FFF2-40B4-BE49-F238E27FC236}">
+                <a16:creationId xmlns:a16="http://schemas.microsoft.com/office/drawing/2014/main" id="{3C86C099-D33A-4CC5-8C34-9B204AD1F2D8}"/>
+              </a:ext>
+            </a:extLst>
+          </p:cNvPr>
+          <p:cNvSpPr txBox="1"/>
+          <p:nvPr/>
+        </p:nvSpPr>
+        <p:spPr>
+          <a:xfrm rot="21396326">
+            <a:off x="8334429" y="5961901"/>
+            <a:ext cx="3425804" cy="461665"/>
+          </a:xfrm>
+          <a:prstGeom prst="rect">
+            <a:avLst/>
+          </a:prstGeom>
+          <a:noFill/>
+        </p:spPr>
+        <p:txBody>
+          <a:bodyPr wrap="square">
+            <a:spAutoFit/>
+          </a:bodyPr>
+          <a:lstStyle/>
+          <a:p>
+            <a:r>
+              <a:rPr lang="en-US" sz="1200" b="1" dirty="0">
+                <a:latin typeface="Space Mono" panose="02000509040000020004" charset="0"/>
+              </a:rPr>
+              <a:t>&gt; But why?</a:t>
+            </a:r>
+          </a:p>
+          <a:p>
+            <a:pPr algn="r"/>
+            <a:r>
+              <a:rPr lang="en-US" sz="1200" b="1" dirty="0">
+                <a:latin typeface="Space Mono" panose="02000509040000020004" charset="0"/>
+              </a:rPr>
+              <a:t>Hold on, we’ll get there. &lt;</a:t>
             </a:r>
           </a:p>
         </p:txBody>
@@ -49246,10 +51813,22 @@
   <p:clrMapOvr>
     <a:masterClrMapping/>
   </p:clrMapOvr>
+  <mc:AlternateContent xmlns:mc="http://schemas.openxmlformats.org/markup-compatibility/2006">
+    <mc:Choice xmlns:p159="http://schemas.microsoft.com/office/powerpoint/2015/09/main" Requires="p159">
+      <p:transition spd="slow">
+        <p159:morph option="byWord"/>
+      </p:transition>
+    </mc:Choice>
+    <mc:Fallback>
+      <p:transition spd="slow">
+        <p:fade/>
+      </p:transition>
+    </mc:Fallback>
+  </mc:AlternateContent>
 </p:sld>
 </file>
 
-<file path=ppt/slides/slide7.xml><?xml version="1.0" encoding="utf-8"?>
+<file path=ppt/slides/slide8.xml><?xml version="1.0" encoding="utf-8"?>
 <p:sld xmlns:a="http://schemas.openxmlformats.org/drawingml/2006/main" xmlns:r="http://schemas.openxmlformats.org/officeDocument/2006/relationships" xmlns:p="http://schemas.openxmlformats.org/presentationml/2006/main">
   <p:cSld>
     <p:spTree>
@@ -49935,7 +52514,7 @@
             <a:schemeClr val="bg1"/>
           </a:solidFill>
           <a:effectLst>
-            <a:outerShdw blurRad="63500" sx="102000" sy="102000" algn="ctr" rotWithShape="0">
+            <a:outerShdw blurRad="50800" dist="38100" dir="8100000" algn="tr" rotWithShape="0">
               <a:prstClr val="black">
                 <a:alpha val="40000"/>
               </a:prstClr>
@@ -50001,7 +52580,7 @@
 </p:sld>
 </file>
 
-<file path=ppt/slides/slide8.xml><?xml version="1.0" encoding="utf-8"?>
+<file path=ppt/slides/slide9.xml><?xml version="1.0" encoding="utf-8"?>
 <p:sld xmlns:a="http://schemas.openxmlformats.org/drawingml/2006/main" xmlns:r="http://schemas.openxmlformats.org/officeDocument/2006/relationships" xmlns:p="http://schemas.openxmlformats.org/presentationml/2006/main">
   <p:cSld>
     <p:spTree>
@@ -50018,6 +52597,1148 @@
           <a:chExt cx="0" cy="0"/>
         </a:xfrm>
       </p:grpSpPr>
+      <p:sp>
+        <p:nvSpPr>
+          <p:cNvPr id="2" name="Title 1">
+            <a:extLst>
+              <a:ext uri="{FF2B5EF4-FFF2-40B4-BE49-F238E27FC236}">
+                <a16:creationId xmlns:a16="http://schemas.microsoft.com/office/drawing/2014/main" id="{09998FE3-E765-4B0F-8B7E-10DEF149CEFD}"/>
+              </a:ext>
+            </a:extLst>
+          </p:cNvPr>
+          <p:cNvSpPr txBox="1">
+            <a:spLocks/>
+          </p:cNvSpPr>
+          <p:nvPr/>
+        </p:nvSpPr>
+        <p:spPr>
+          <a:xfrm>
+            <a:off x="615043" y="398760"/>
+            <a:ext cx="10961914" cy="2236623"/>
+          </a:xfrm>
+          <a:prstGeom prst="roundRect">
+            <a:avLst>
+              <a:gd name="adj" fmla="val 50000"/>
+            </a:avLst>
+          </a:prstGeom>
+          <a:solidFill>
+            <a:schemeClr val="bg1"/>
+          </a:solidFill>
+          <a:effectLst>
+            <a:outerShdw blurRad="50800" dist="38100" dir="8100000" algn="tr" rotWithShape="0">
+              <a:prstClr val="black">
+                <a:alpha val="40000"/>
+              </a:prstClr>
+            </a:outerShdw>
+          </a:effectLst>
+        </p:spPr>
+        <p:txBody>
+          <a:bodyPr wrap="square" lIns="0" tIns="108000" anchor="ctr" anchorCtr="0">
+            <a:normAutofit fontScale="85000" lnSpcReduction="10000"/>
+          </a:bodyPr>
+          <a:lstStyle>
+            <a:lvl1pPr algn="l" defTabSz="914400" rtl="0" eaLnBrk="1" latinLnBrk="0" hangingPunct="1">
+              <a:lnSpc>
+                <a:spcPct val="90000"/>
+              </a:lnSpc>
+              <a:spcBef>
+                <a:spcPct val="0"/>
+              </a:spcBef>
+              <a:buNone/>
+              <a:defRPr sz="4400" kern="1200">
+                <a:solidFill>
+                  <a:schemeClr val="tx1"/>
+                </a:solidFill>
+                <a:latin typeface="+mj-lt"/>
+                <a:ea typeface="+mj-ea"/>
+                <a:cs typeface="+mj-cs"/>
+              </a:defRPr>
+            </a:lvl1pPr>
+          </a:lstStyle>
+          <a:p>
+            <a:pPr algn="ctr"/>
+            <a:r>
+              <a:rPr lang="en-US" sz="6000" b="1" dirty="0">
+                <a:latin typeface="Space Mono" panose="02000509040000020004" charset="0"/>
+              </a:rPr>
+              <a:t>Aren’t there simpler ways to find palindromes?</a:t>
+            </a:r>
+          </a:p>
+        </p:txBody>
+      </p:sp>
+      <p:graphicFrame>
+        <p:nvGraphicFramePr>
+          <p:cNvPr id="3" name="Table 2">
+            <a:extLst>
+              <a:ext uri="{FF2B5EF4-FFF2-40B4-BE49-F238E27FC236}">
+                <a16:creationId xmlns:a16="http://schemas.microsoft.com/office/drawing/2014/main" id="{B01FF60B-9987-4EE4-A6E9-285E6B72487D}"/>
+              </a:ext>
+            </a:extLst>
+          </p:cNvPr>
+          <p:cNvGraphicFramePr>
+            <a:graphicFrameLocks noGrp="1"/>
+          </p:cNvGraphicFramePr>
+          <p:nvPr>
+            <p:extLst>
+              <p:ext uri="{D42A27DB-BD31-4B8C-83A1-F6EECF244321}">
+                <p14:modId xmlns:p14="http://schemas.microsoft.com/office/powerpoint/2010/main" val="480988879"/>
+              </p:ext>
+            </p:extLst>
+          </p:nvPr>
+        </p:nvGraphicFramePr>
+        <p:xfrm>
+          <a:off x="1367394" y="2874818"/>
+          <a:ext cx="9457212" cy="3434080"/>
+        </p:xfrm>
+        <a:graphic>
+          <a:graphicData uri="http://schemas.openxmlformats.org/drawingml/2006/table">
+            <a:tbl>
+              <a:tblPr/>
+              <a:tblGrid>
+                <a:gridCol w="4700290">
+                  <a:extLst>
+                    <a:ext uri="{9D8B030D-6E8A-4147-A177-3AD203B41FA5}">
+                      <a16:colId xmlns:a16="http://schemas.microsoft.com/office/drawing/2014/main" val="3827352749"/>
+                    </a:ext>
+                  </a:extLst>
+                </a:gridCol>
+                <a:gridCol w="2350479">
+                  <a:extLst>
+                    <a:ext uri="{9D8B030D-6E8A-4147-A177-3AD203B41FA5}">
+                      <a16:colId xmlns:a16="http://schemas.microsoft.com/office/drawing/2014/main" val="138317806"/>
+                    </a:ext>
+                  </a:extLst>
+                </a:gridCol>
+                <a:gridCol w="2406443">
+                  <a:extLst>
+                    <a:ext uri="{9D8B030D-6E8A-4147-A177-3AD203B41FA5}">
+                      <a16:colId xmlns:a16="http://schemas.microsoft.com/office/drawing/2014/main" val="847482600"/>
+                    </a:ext>
+                  </a:extLst>
+                </a:gridCol>
+              </a:tblGrid>
+              <a:tr h="0">
+                <a:tc>
+                  <a:txBody>
+                    <a:bodyPr/>
+                    <a:lstStyle/>
+                    <a:p>
+                      <a:pPr marL="0" marR="0" fontAlgn="t">
+                        <a:spcBef>
+                          <a:spcPts val="0"/>
+                        </a:spcBef>
+                        <a:spcAft>
+                          <a:spcPts val="0"/>
+                        </a:spcAft>
+                      </a:pPr>
+                      <a:r>
+                        <a:rPr lang="en-US" sz="2400" b="1" dirty="0">
+                          <a:effectLst/>
+                          <a:latin typeface="Quicksand" charset="0"/>
+                        </a:rPr>
+                        <a:t>Approach</a:t>
+                      </a:r>
+                    </a:p>
+                  </a:txBody>
+                  <a:tcPr marL="50800" marR="50800" marT="50800" marB="50800">
+                    <a:lnL w="12700" cap="flat" cmpd="sng" algn="ctr">
+                      <a:solidFill>
+                        <a:srgbClr val="A3A3A3"/>
+                      </a:solidFill>
+                      <a:prstDash val="solid"/>
+                      <a:round/>
+                      <a:headEnd type="none" w="med" len="med"/>
+                      <a:tailEnd type="none" w="med" len="med"/>
+                    </a:lnL>
+                    <a:lnR w="12700" cap="flat" cmpd="sng" algn="ctr">
+                      <a:solidFill>
+                        <a:srgbClr val="A3A3A3"/>
+                      </a:solidFill>
+                      <a:prstDash val="solid"/>
+                      <a:round/>
+                      <a:headEnd type="none" w="med" len="med"/>
+                      <a:tailEnd type="none" w="med" len="med"/>
+                    </a:lnR>
+                    <a:lnT w="12700" cap="flat" cmpd="sng" algn="ctr">
+                      <a:solidFill>
+                        <a:srgbClr val="A3A3A3"/>
+                      </a:solidFill>
+                      <a:prstDash val="solid"/>
+                      <a:round/>
+                      <a:headEnd type="none" w="med" len="med"/>
+                      <a:tailEnd type="none" w="med" len="med"/>
+                    </a:lnT>
+                    <a:lnB w="12700" cap="flat" cmpd="sng" algn="ctr">
+                      <a:solidFill>
+                        <a:srgbClr val="A3A3A3"/>
+                      </a:solidFill>
+                      <a:prstDash val="solid"/>
+                      <a:round/>
+                      <a:headEnd type="none" w="med" len="med"/>
+                      <a:tailEnd type="none" w="med" len="med"/>
+                    </a:lnB>
+                  </a:tcPr>
+                </a:tc>
+                <a:tc>
+                  <a:txBody>
+                    <a:bodyPr/>
+                    <a:lstStyle/>
+                    <a:p>
+                      <a:pPr marL="0" marR="0" fontAlgn="t">
+                        <a:spcBef>
+                          <a:spcPts val="0"/>
+                        </a:spcBef>
+                        <a:spcAft>
+                          <a:spcPts val="0"/>
+                        </a:spcAft>
+                      </a:pPr>
+                      <a:r>
+                        <a:rPr lang="en-US" sz="2400" b="1" dirty="0">
+                          <a:effectLst/>
+                          <a:latin typeface="Quicksand" charset="0"/>
+                        </a:rPr>
+                        <a:t>Space Complexity</a:t>
+                      </a:r>
+                    </a:p>
+                  </a:txBody>
+                  <a:tcPr marL="50800" marR="50800" marT="50800" marB="50800">
+                    <a:lnL w="12700" cap="flat" cmpd="sng" algn="ctr">
+                      <a:solidFill>
+                        <a:srgbClr val="A3A3A3"/>
+                      </a:solidFill>
+                      <a:prstDash val="solid"/>
+                      <a:round/>
+                      <a:headEnd type="none" w="med" len="med"/>
+                      <a:tailEnd type="none" w="med" len="med"/>
+                    </a:lnL>
+                    <a:lnR w="12700" cap="flat" cmpd="sng" algn="ctr">
+                      <a:solidFill>
+                        <a:srgbClr val="A3A3A3"/>
+                      </a:solidFill>
+                      <a:prstDash val="solid"/>
+                      <a:round/>
+                      <a:headEnd type="none" w="med" len="med"/>
+                      <a:tailEnd type="none" w="med" len="med"/>
+                    </a:lnR>
+                    <a:lnT w="12700" cap="flat" cmpd="sng" algn="ctr">
+                      <a:solidFill>
+                        <a:srgbClr val="A3A3A3"/>
+                      </a:solidFill>
+                      <a:prstDash val="solid"/>
+                      <a:round/>
+                      <a:headEnd type="none" w="med" len="med"/>
+                      <a:tailEnd type="none" w="med" len="med"/>
+                    </a:lnT>
+                    <a:lnB w="12700" cap="flat" cmpd="sng" algn="ctr">
+                      <a:solidFill>
+                        <a:srgbClr val="A3A3A3"/>
+                      </a:solidFill>
+                      <a:prstDash val="solid"/>
+                      <a:round/>
+                      <a:headEnd type="none" w="med" len="med"/>
+                      <a:tailEnd type="none" w="med" len="med"/>
+                    </a:lnB>
+                  </a:tcPr>
+                </a:tc>
+                <a:tc>
+                  <a:txBody>
+                    <a:bodyPr/>
+                    <a:lstStyle/>
+                    <a:p>
+                      <a:pPr marL="0" marR="0" fontAlgn="t">
+                        <a:spcBef>
+                          <a:spcPts val="0"/>
+                        </a:spcBef>
+                        <a:spcAft>
+                          <a:spcPts val="0"/>
+                        </a:spcAft>
+                      </a:pPr>
+                      <a:r>
+                        <a:rPr lang="en-US" sz="2400" b="1" dirty="0">
+                          <a:effectLst/>
+                          <a:latin typeface="Quicksand" charset="0"/>
+                        </a:rPr>
+                        <a:t>Time Complexity</a:t>
+                      </a:r>
+                    </a:p>
+                  </a:txBody>
+                  <a:tcPr marL="50800" marR="50800" marT="50800" marB="50800">
+                    <a:lnL w="12700" cap="flat" cmpd="sng" algn="ctr">
+                      <a:solidFill>
+                        <a:srgbClr val="A3A3A3"/>
+                      </a:solidFill>
+                      <a:prstDash val="solid"/>
+                      <a:round/>
+                      <a:headEnd type="none" w="med" len="med"/>
+                      <a:tailEnd type="none" w="med" len="med"/>
+                    </a:lnL>
+                    <a:lnR w="12700" cap="flat" cmpd="sng" algn="ctr">
+                      <a:solidFill>
+                        <a:srgbClr val="A3A3A3"/>
+                      </a:solidFill>
+                      <a:prstDash val="solid"/>
+                      <a:round/>
+                      <a:headEnd type="none" w="med" len="med"/>
+                      <a:tailEnd type="none" w="med" len="med"/>
+                    </a:lnR>
+                    <a:lnT w="12700" cap="flat" cmpd="sng" algn="ctr">
+                      <a:solidFill>
+                        <a:srgbClr val="A3A3A3"/>
+                      </a:solidFill>
+                      <a:prstDash val="solid"/>
+                      <a:round/>
+                      <a:headEnd type="none" w="med" len="med"/>
+                      <a:tailEnd type="none" w="med" len="med"/>
+                    </a:lnT>
+                    <a:lnB w="12700" cap="flat" cmpd="sng" algn="ctr">
+                      <a:solidFill>
+                        <a:srgbClr val="A3A3A3"/>
+                      </a:solidFill>
+                      <a:prstDash val="solid"/>
+                      <a:round/>
+                      <a:headEnd type="none" w="med" len="med"/>
+                      <a:tailEnd type="none" w="med" len="med"/>
+                    </a:lnB>
+                  </a:tcPr>
+                </a:tc>
+                <a:extLst>
+                  <a:ext uri="{0D108BD9-81ED-4DB2-BD59-A6C34878D82A}">
+                    <a16:rowId xmlns:a16="http://schemas.microsoft.com/office/drawing/2014/main" val="300287619"/>
+                  </a:ext>
+                </a:extLst>
+              </a:tr>
+              <a:tr h="0">
+                <a:tc>
+                  <a:txBody>
+                    <a:bodyPr/>
+                    <a:lstStyle/>
+                    <a:p>
+                      <a:pPr marL="0" marR="0" fontAlgn="t">
+                        <a:spcBef>
+                          <a:spcPts val="0"/>
+                        </a:spcBef>
+                        <a:spcAft>
+                          <a:spcPts val="0"/>
+                        </a:spcAft>
+                      </a:pPr>
+                      <a:r>
+                        <a:rPr lang="en-US" sz="2400" dirty="0">
+                          <a:effectLst/>
+                          <a:latin typeface="Quicksand Medium" charset="0"/>
+                        </a:rPr>
+                        <a:t>Compare original string with new reserved string</a:t>
+                      </a:r>
+                    </a:p>
+                  </a:txBody>
+                  <a:tcPr marL="50800" marR="50800" marT="50800" marB="50800">
+                    <a:lnL w="12700" cap="flat" cmpd="sng" algn="ctr">
+                      <a:solidFill>
+                        <a:srgbClr val="A3A3A3"/>
+                      </a:solidFill>
+                      <a:prstDash val="solid"/>
+                      <a:round/>
+                      <a:headEnd type="none" w="med" len="med"/>
+                      <a:tailEnd type="none" w="med" len="med"/>
+                    </a:lnL>
+                    <a:lnR w="12700" cap="flat" cmpd="sng" algn="ctr">
+                      <a:solidFill>
+                        <a:srgbClr val="A3A3A3"/>
+                      </a:solidFill>
+                      <a:prstDash val="solid"/>
+                      <a:round/>
+                      <a:headEnd type="none" w="med" len="med"/>
+                      <a:tailEnd type="none" w="med" len="med"/>
+                    </a:lnR>
+                    <a:lnT w="12700" cap="flat" cmpd="sng" algn="ctr">
+                      <a:solidFill>
+                        <a:srgbClr val="A3A3A3"/>
+                      </a:solidFill>
+                      <a:prstDash val="solid"/>
+                      <a:round/>
+                      <a:headEnd type="none" w="med" len="med"/>
+                      <a:tailEnd type="none" w="med" len="med"/>
+                    </a:lnT>
+                    <a:lnB w="12700" cap="flat" cmpd="sng" algn="ctr">
+                      <a:solidFill>
+                        <a:srgbClr val="A3A3A3"/>
+                      </a:solidFill>
+                      <a:prstDash val="solid"/>
+                      <a:round/>
+                      <a:headEnd type="none" w="med" len="med"/>
+                      <a:tailEnd type="none" w="med" len="med"/>
+                    </a:lnB>
+                  </a:tcPr>
+                </a:tc>
+                <a:tc>
+                  <a:txBody>
+                    <a:bodyPr/>
+                    <a:lstStyle/>
+                    <a:p>
+                      <a:pPr marL="0" marR="0" fontAlgn="t">
+                        <a:spcBef>
+                          <a:spcPts val="0"/>
+                        </a:spcBef>
+                        <a:spcAft>
+                          <a:spcPts val="0"/>
+                        </a:spcAft>
+                      </a:pPr>
+                      <a:r>
+                        <a:rPr lang="en-US" sz="2400" b="1" i="1" dirty="0">
+                          <a:effectLst/>
+                          <a:latin typeface="Cambria" panose="02040503050406030204" pitchFamily="18" charset="0"/>
+                          <a:ea typeface="Cambria" panose="02040503050406030204" pitchFamily="18" charset="0"/>
+                        </a:rPr>
+                        <a:t>O(n)</a:t>
+                      </a:r>
+                    </a:p>
+                  </a:txBody>
+                  <a:tcPr marL="50800" marR="50800" marT="50800" marB="50800">
+                    <a:lnL w="12700" cap="flat" cmpd="sng" algn="ctr">
+                      <a:solidFill>
+                        <a:srgbClr val="A3A3A3"/>
+                      </a:solidFill>
+                      <a:prstDash val="solid"/>
+                      <a:round/>
+                      <a:headEnd type="none" w="med" len="med"/>
+                      <a:tailEnd type="none" w="med" len="med"/>
+                    </a:lnL>
+                    <a:lnR w="12700" cap="flat" cmpd="sng" algn="ctr">
+                      <a:solidFill>
+                        <a:srgbClr val="A3A3A3"/>
+                      </a:solidFill>
+                      <a:prstDash val="solid"/>
+                      <a:round/>
+                      <a:headEnd type="none" w="med" len="med"/>
+                      <a:tailEnd type="none" w="med" len="med"/>
+                    </a:lnR>
+                    <a:lnT w="12700" cap="flat" cmpd="sng" algn="ctr">
+                      <a:solidFill>
+                        <a:srgbClr val="A3A3A3"/>
+                      </a:solidFill>
+                      <a:prstDash val="solid"/>
+                      <a:round/>
+                      <a:headEnd type="none" w="med" len="med"/>
+                      <a:tailEnd type="none" w="med" len="med"/>
+                    </a:lnT>
+                    <a:lnB w="12700" cap="flat" cmpd="sng" algn="ctr">
+                      <a:solidFill>
+                        <a:srgbClr val="A3A3A3"/>
+                      </a:solidFill>
+                      <a:prstDash val="solid"/>
+                      <a:round/>
+                      <a:headEnd type="none" w="med" len="med"/>
+                      <a:tailEnd type="none" w="med" len="med"/>
+                    </a:lnB>
+                  </a:tcPr>
+                </a:tc>
+                <a:tc>
+                  <a:txBody>
+                    <a:bodyPr/>
+                    <a:lstStyle/>
+                    <a:p>
+                      <a:pPr marL="0" marR="0" fontAlgn="t">
+                        <a:spcBef>
+                          <a:spcPts val="0"/>
+                        </a:spcBef>
+                        <a:spcAft>
+                          <a:spcPts val="0"/>
+                        </a:spcAft>
+                      </a:pPr>
+                      <a:r>
+                        <a:rPr lang="en-US" sz="2400" b="1" i="1" dirty="0">
+                          <a:effectLst/>
+                          <a:latin typeface="Cambria" panose="02040503050406030204" pitchFamily="18" charset="0"/>
+                          <a:ea typeface="Cambria" panose="02040503050406030204" pitchFamily="18" charset="0"/>
+                        </a:rPr>
+                        <a:t>O(n</a:t>
+                      </a:r>
+                      <a:r>
+                        <a:rPr lang="en-US" sz="2400" b="1" i="1" baseline="30000" dirty="0">
+                          <a:effectLst/>
+                          <a:latin typeface="Cambria" panose="02040503050406030204" pitchFamily="18" charset="0"/>
+                          <a:ea typeface="Cambria" panose="02040503050406030204" pitchFamily="18" charset="0"/>
+                        </a:rPr>
+                        <a:t>2</a:t>
+                      </a:r>
+                      <a:r>
+                        <a:rPr lang="en-US" sz="2400" b="1" i="1" dirty="0">
+                          <a:effectLst/>
+                          <a:latin typeface="Cambria" panose="02040503050406030204" pitchFamily="18" charset="0"/>
+                          <a:ea typeface="Cambria" panose="02040503050406030204" pitchFamily="18" charset="0"/>
+                        </a:rPr>
+                        <a:t>)</a:t>
+                      </a:r>
+                    </a:p>
+                  </a:txBody>
+                  <a:tcPr marL="50800" marR="50800" marT="50800" marB="50800">
+                    <a:lnL w="12700" cap="flat" cmpd="sng" algn="ctr">
+                      <a:solidFill>
+                        <a:srgbClr val="A3A3A3"/>
+                      </a:solidFill>
+                      <a:prstDash val="solid"/>
+                      <a:round/>
+                      <a:headEnd type="none" w="med" len="med"/>
+                      <a:tailEnd type="none" w="med" len="med"/>
+                    </a:lnL>
+                    <a:lnR w="12700" cap="flat" cmpd="sng" algn="ctr">
+                      <a:solidFill>
+                        <a:srgbClr val="A3A3A3"/>
+                      </a:solidFill>
+                      <a:prstDash val="solid"/>
+                      <a:round/>
+                      <a:headEnd type="none" w="med" len="med"/>
+                      <a:tailEnd type="none" w="med" len="med"/>
+                    </a:lnR>
+                    <a:lnT w="12700" cap="flat" cmpd="sng" algn="ctr">
+                      <a:solidFill>
+                        <a:srgbClr val="A3A3A3"/>
+                      </a:solidFill>
+                      <a:prstDash val="solid"/>
+                      <a:round/>
+                      <a:headEnd type="none" w="med" len="med"/>
+                      <a:tailEnd type="none" w="med" len="med"/>
+                    </a:lnT>
+                    <a:lnB w="12700" cap="flat" cmpd="sng" algn="ctr">
+                      <a:solidFill>
+                        <a:srgbClr val="A3A3A3"/>
+                      </a:solidFill>
+                      <a:prstDash val="solid"/>
+                      <a:round/>
+                      <a:headEnd type="none" w="med" len="med"/>
+                      <a:tailEnd type="none" w="med" len="med"/>
+                    </a:lnB>
+                  </a:tcPr>
+                </a:tc>
+                <a:extLst>
+                  <a:ext uri="{0D108BD9-81ED-4DB2-BD59-A6C34878D82A}">
+                    <a16:rowId xmlns:a16="http://schemas.microsoft.com/office/drawing/2014/main" val="3988012055"/>
+                  </a:ext>
+                </a:extLst>
+              </a:tr>
+              <a:tr h="0">
+                <a:tc>
+                  <a:txBody>
+                    <a:bodyPr/>
+                    <a:lstStyle/>
+                    <a:p>
+                      <a:pPr marL="0" marR="0" fontAlgn="t">
+                        <a:spcBef>
+                          <a:spcPts val="0"/>
+                        </a:spcBef>
+                        <a:spcAft>
+                          <a:spcPts val="0"/>
+                        </a:spcAft>
+                      </a:pPr>
+                      <a:r>
+                        <a:rPr lang="en-US" sz="2400" dirty="0">
+                          <a:effectLst/>
+                          <a:latin typeface="Quicksand Medium" charset="0"/>
+                        </a:rPr>
+                        <a:t>Fast/Slow pointer</a:t>
+                      </a:r>
+                    </a:p>
+                  </a:txBody>
+                  <a:tcPr marL="50800" marR="50800" marT="50800" marB="50800">
+                    <a:lnL w="12700" cap="flat" cmpd="sng" algn="ctr">
+                      <a:solidFill>
+                        <a:srgbClr val="A3A3A3"/>
+                      </a:solidFill>
+                      <a:prstDash val="solid"/>
+                      <a:round/>
+                      <a:headEnd type="none" w="med" len="med"/>
+                      <a:tailEnd type="none" w="med" len="med"/>
+                    </a:lnL>
+                    <a:lnR w="12700" cap="flat" cmpd="sng" algn="ctr">
+                      <a:solidFill>
+                        <a:srgbClr val="A3A3A3"/>
+                      </a:solidFill>
+                      <a:prstDash val="solid"/>
+                      <a:round/>
+                      <a:headEnd type="none" w="med" len="med"/>
+                      <a:tailEnd type="none" w="med" len="med"/>
+                    </a:lnR>
+                    <a:lnT w="12700" cap="flat" cmpd="sng" algn="ctr">
+                      <a:solidFill>
+                        <a:srgbClr val="A3A3A3"/>
+                      </a:solidFill>
+                      <a:prstDash val="solid"/>
+                      <a:round/>
+                      <a:headEnd type="none" w="med" len="med"/>
+                      <a:tailEnd type="none" w="med" len="med"/>
+                    </a:lnT>
+                    <a:lnB w="12700" cap="flat" cmpd="sng" algn="ctr">
+                      <a:solidFill>
+                        <a:srgbClr val="A3A3A3"/>
+                      </a:solidFill>
+                      <a:prstDash val="solid"/>
+                      <a:round/>
+                      <a:headEnd type="none" w="med" len="med"/>
+                      <a:tailEnd type="none" w="med" len="med"/>
+                    </a:lnB>
+                  </a:tcPr>
+                </a:tc>
+                <a:tc>
+                  <a:txBody>
+                    <a:bodyPr/>
+                    <a:lstStyle/>
+                    <a:p>
+                      <a:pPr marL="0" marR="0" fontAlgn="t">
+                        <a:spcBef>
+                          <a:spcPts val="0"/>
+                        </a:spcBef>
+                        <a:spcAft>
+                          <a:spcPts val="0"/>
+                        </a:spcAft>
+                      </a:pPr>
+                      <a:r>
+                        <a:rPr lang="en-US" sz="2400" b="1" i="1" dirty="0">
+                          <a:effectLst/>
+                          <a:latin typeface="Cambria" panose="02040503050406030204" pitchFamily="18" charset="0"/>
+                          <a:ea typeface="Cambria" panose="02040503050406030204" pitchFamily="18" charset="0"/>
+                        </a:rPr>
+                        <a:t>O(1)*</a:t>
+                      </a:r>
+                    </a:p>
+                  </a:txBody>
+                  <a:tcPr marL="50800" marR="50800" marT="50800" marB="50800">
+                    <a:lnL w="12700" cap="flat" cmpd="sng" algn="ctr">
+                      <a:solidFill>
+                        <a:srgbClr val="A3A3A3"/>
+                      </a:solidFill>
+                      <a:prstDash val="solid"/>
+                      <a:round/>
+                      <a:headEnd type="none" w="med" len="med"/>
+                      <a:tailEnd type="none" w="med" len="med"/>
+                    </a:lnL>
+                    <a:lnR w="12700" cap="flat" cmpd="sng" algn="ctr">
+                      <a:solidFill>
+                        <a:srgbClr val="A3A3A3"/>
+                      </a:solidFill>
+                      <a:prstDash val="solid"/>
+                      <a:round/>
+                      <a:headEnd type="none" w="med" len="med"/>
+                      <a:tailEnd type="none" w="med" len="med"/>
+                    </a:lnR>
+                    <a:lnT w="12700" cap="flat" cmpd="sng" algn="ctr">
+                      <a:solidFill>
+                        <a:srgbClr val="A3A3A3"/>
+                      </a:solidFill>
+                      <a:prstDash val="solid"/>
+                      <a:round/>
+                      <a:headEnd type="none" w="med" len="med"/>
+                      <a:tailEnd type="none" w="med" len="med"/>
+                    </a:lnT>
+                    <a:lnB w="12700" cap="flat" cmpd="sng" algn="ctr">
+                      <a:solidFill>
+                        <a:srgbClr val="A3A3A3"/>
+                      </a:solidFill>
+                      <a:prstDash val="solid"/>
+                      <a:round/>
+                      <a:headEnd type="none" w="med" len="med"/>
+                      <a:tailEnd type="none" w="med" len="med"/>
+                    </a:lnB>
+                  </a:tcPr>
+                </a:tc>
+                <a:tc>
+                  <a:txBody>
+                    <a:bodyPr/>
+                    <a:lstStyle/>
+                    <a:p>
+                      <a:pPr marL="0" marR="0" fontAlgn="t">
+                        <a:spcBef>
+                          <a:spcPts val="0"/>
+                        </a:spcBef>
+                        <a:spcAft>
+                          <a:spcPts val="0"/>
+                        </a:spcAft>
+                      </a:pPr>
+                      <a:r>
+                        <a:rPr lang="en-US" sz="2400" b="1" i="1" dirty="0">
+                          <a:effectLst/>
+                          <a:latin typeface="Cambria" panose="02040503050406030204" pitchFamily="18" charset="0"/>
+                          <a:ea typeface="Cambria" panose="02040503050406030204" pitchFamily="18" charset="0"/>
+                        </a:rPr>
+                        <a:t>O(n)</a:t>
+                      </a:r>
+                    </a:p>
+                  </a:txBody>
+                  <a:tcPr marL="50800" marR="50800" marT="50800" marB="50800">
+                    <a:lnL w="12700" cap="flat" cmpd="sng" algn="ctr">
+                      <a:solidFill>
+                        <a:srgbClr val="A3A3A3"/>
+                      </a:solidFill>
+                      <a:prstDash val="solid"/>
+                      <a:round/>
+                      <a:headEnd type="none" w="med" len="med"/>
+                      <a:tailEnd type="none" w="med" len="med"/>
+                    </a:lnL>
+                    <a:lnR w="12700" cap="flat" cmpd="sng" algn="ctr">
+                      <a:solidFill>
+                        <a:srgbClr val="A3A3A3"/>
+                      </a:solidFill>
+                      <a:prstDash val="solid"/>
+                      <a:round/>
+                      <a:headEnd type="none" w="med" len="med"/>
+                      <a:tailEnd type="none" w="med" len="med"/>
+                    </a:lnR>
+                    <a:lnT w="12700" cap="flat" cmpd="sng" algn="ctr">
+                      <a:solidFill>
+                        <a:srgbClr val="A3A3A3"/>
+                      </a:solidFill>
+                      <a:prstDash val="solid"/>
+                      <a:round/>
+                      <a:headEnd type="none" w="med" len="med"/>
+                      <a:tailEnd type="none" w="med" len="med"/>
+                    </a:lnT>
+                    <a:lnB w="12700" cap="flat" cmpd="sng" algn="ctr">
+                      <a:solidFill>
+                        <a:srgbClr val="A3A3A3"/>
+                      </a:solidFill>
+                      <a:prstDash val="solid"/>
+                      <a:round/>
+                      <a:headEnd type="none" w="med" len="med"/>
+                      <a:tailEnd type="none" w="med" len="med"/>
+                    </a:lnB>
+                  </a:tcPr>
+                </a:tc>
+                <a:extLst>
+                  <a:ext uri="{0D108BD9-81ED-4DB2-BD59-A6C34878D82A}">
+                    <a16:rowId xmlns:a16="http://schemas.microsoft.com/office/drawing/2014/main" val="985764753"/>
+                  </a:ext>
+                </a:extLst>
+              </a:tr>
+              <a:tr h="0">
+                <a:tc>
+                  <a:txBody>
+                    <a:bodyPr/>
+                    <a:lstStyle/>
+                    <a:p>
+                      <a:pPr marL="0" marR="0" fontAlgn="t">
+                        <a:spcBef>
+                          <a:spcPts val="0"/>
+                        </a:spcBef>
+                        <a:spcAft>
+                          <a:spcPts val="0"/>
+                        </a:spcAft>
+                      </a:pPr>
+                      <a:r>
+                        <a:rPr lang="en-US" sz="2400" dirty="0">
+                          <a:effectLst/>
+                          <a:latin typeface="Quicksand Medium" charset="0"/>
+                        </a:rPr>
+                        <a:t>Comparing left and right side with pointer</a:t>
+                      </a:r>
+                    </a:p>
+                  </a:txBody>
+                  <a:tcPr marL="50800" marR="50800" marT="50800" marB="50800">
+                    <a:lnL w="12700" cap="flat" cmpd="sng" algn="ctr">
+                      <a:solidFill>
+                        <a:srgbClr val="A3A3A3"/>
+                      </a:solidFill>
+                      <a:prstDash val="solid"/>
+                      <a:round/>
+                      <a:headEnd type="none" w="med" len="med"/>
+                      <a:tailEnd type="none" w="med" len="med"/>
+                    </a:lnL>
+                    <a:lnR w="12700" cap="flat" cmpd="sng" algn="ctr">
+                      <a:solidFill>
+                        <a:srgbClr val="A3A3A3"/>
+                      </a:solidFill>
+                      <a:prstDash val="solid"/>
+                      <a:round/>
+                      <a:headEnd type="none" w="med" len="med"/>
+                      <a:tailEnd type="none" w="med" len="med"/>
+                    </a:lnR>
+                    <a:lnT w="12700" cap="flat" cmpd="sng" algn="ctr">
+                      <a:solidFill>
+                        <a:srgbClr val="A3A3A3"/>
+                      </a:solidFill>
+                      <a:prstDash val="solid"/>
+                      <a:round/>
+                      <a:headEnd type="none" w="med" len="med"/>
+                      <a:tailEnd type="none" w="med" len="med"/>
+                    </a:lnT>
+                    <a:lnB w="12700" cap="flat" cmpd="sng" algn="ctr">
+                      <a:solidFill>
+                        <a:srgbClr val="A3A3A3"/>
+                      </a:solidFill>
+                      <a:prstDash val="solid"/>
+                      <a:round/>
+                      <a:headEnd type="none" w="med" len="med"/>
+                      <a:tailEnd type="none" w="med" len="med"/>
+                    </a:lnB>
+                  </a:tcPr>
+                </a:tc>
+                <a:tc>
+                  <a:txBody>
+                    <a:bodyPr/>
+                    <a:lstStyle/>
+                    <a:p>
+                      <a:pPr marL="0" marR="0" fontAlgn="t">
+                        <a:spcBef>
+                          <a:spcPts val="0"/>
+                        </a:spcBef>
+                        <a:spcAft>
+                          <a:spcPts val="0"/>
+                        </a:spcAft>
+                      </a:pPr>
+                      <a:r>
+                        <a:rPr lang="en-US" sz="2400" b="1" i="1" dirty="0">
+                          <a:effectLst/>
+                          <a:latin typeface="Cambria" panose="02040503050406030204" pitchFamily="18" charset="0"/>
+                          <a:ea typeface="Cambria" panose="02040503050406030204" pitchFamily="18" charset="0"/>
+                        </a:rPr>
+                        <a:t>?</a:t>
+                      </a:r>
+                    </a:p>
+                  </a:txBody>
+                  <a:tcPr marL="50800" marR="50800" marT="50800" marB="50800">
+                    <a:lnL w="12700" cap="flat" cmpd="sng" algn="ctr">
+                      <a:solidFill>
+                        <a:srgbClr val="A3A3A3"/>
+                      </a:solidFill>
+                      <a:prstDash val="solid"/>
+                      <a:round/>
+                      <a:headEnd type="none" w="med" len="med"/>
+                      <a:tailEnd type="none" w="med" len="med"/>
+                    </a:lnL>
+                    <a:lnR w="12700" cap="flat" cmpd="sng" algn="ctr">
+                      <a:solidFill>
+                        <a:srgbClr val="A3A3A3"/>
+                      </a:solidFill>
+                      <a:prstDash val="solid"/>
+                      <a:round/>
+                      <a:headEnd type="none" w="med" len="med"/>
+                      <a:tailEnd type="none" w="med" len="med"/>
+                    </a:lnR>
+                    <a:lnT w="12700" cap="flat" cmpd="sng" algn="ctr">
+                      <a:solidFill>
+                        <a:srgbClr val="A3A3A3"/>
+                      </a:solidFill>
+                      <a:prstDash val="solid"/>
+                      <a:round/>
+                      <a:headEnd type="none" w="med" len="med"/>
+                      <a:tailEnd type="none" w="med" len="med"/>
+                    </a:lnT>
+                    <a:lnB w="12700" cap="flat" cmpd="sng" algn="ctr">
+                      <a:solidFill>
+                        <a:srgbClr val="A3A3A3"/>
+                      </a:solidFill>
+                      <a:prstDash val="solid"/>
+                      <a:round/>
+                      <a:headEnd type="none" w="med" len="med"/>
+                      <a:tailEnd type="none" w="med" len="med"/>
+                    </a:lnB>
+                  </a:tcPr>
+                </a:tc>
+                <a:tc>
+                  <a:txBody>
+                    <a:bodyPr/>
+                    <a:lstStyle/>
+                    <a:p>
+                      <a:pPr marL="0" marR="0" fontAlgn="t">
+                        <a:spcBef>
+                          <a:spcPts val="0"/>
+                        </a:spcBef>
+                        <a:spcAft>
+                          <a:spcPts val="0"/>
+                        </a:spcAft>
+                      </a:pPr>
+                      <a:r>
+                        <a:rPr lang="en-US" sz="2400" b="1" i="1" dirty="0">
+                          <a:effectLst/>
+                          <a:latin typeface="Cambria" panose="02040503050406030204" pitchFamily="18" charset="0"/>
+                          <a:ea typeface="Cambria" panose="02040503050406030204" pitchFamily="18" charset="0"/>
+                        </a:rPr>
+                        <a:t>O(n)</a:t>
+                      </a:r>
+                    </a:p>
+                  </a:txBody>
+                  <a:tcPr marL="50800" marR="50800" marT="50800" marB="50800">
+                    <a:lnL w="12700" cap="flat" cmpd="sng" algn="ctr">
+                      <a:solidFill>
+                        <a:srgbClr val="A3A3A3"/>
+                      </a:solidFill>
+                      <a:prstDash val="solid"/>
+                      <a:round/>
+                      <a:headEnd type="none" w="med" len="med"/>
+                      <a:tailEnd type="none" w="med" len="med"/>
+                    </a:lnL>
+                    <a:lnR w="12700" cap="flat" cmpd="sng" algn="ctr">
+                      <a:solidFill>
+                        <a:srgbClr val="A3A3A3"/>
+                      </a:solidFill>
+                      <a:prstDash val="solid"/>
+                      <a:round/>
+                      <a:headEnd type="none" w="med" len="med"/>
+                      <a:tailEnd type="none" w="med" len="med"/>
+                    </a:lnR>
+                    <a:lnT w="12700" cap="flat" cmpd="sng" algn="ctr">
+                      <a:solidFill>
+                        <a:srgbClr val="A3A3A3"/>
+                      </a:solidFill>
+                      <a:prstDash val="solid"/>
+                      <a:round/>
+                      <a:headEnd type="none" w="med" len="med"/>
+                      <a:tailEnd type="none" w="med" len="med"/>
+                    </a:lnT>
+                    <a:lnB w="12700" cap="flat" cmpd="sng" algn="ctr">
+                      <a:solidFill>
+                        <a:srgbClr val="A3A3A3"/>
+                      </a:solidFill>
+                      <a:prstDash val="solid"/>
+                      <a:round/>
+                      <a:headEnd type="none" w="med" len="med"/>
+                      <a:tailEnd type="none" w="med" len="med"/>
+                    </a:lnB>
+                  </a:tcPr>
+                </a:tc>
+                <a:extLst>
+                  <a:ext uri="{0D108BD9-81ED-4DB2-BD59-A6C34878D82A}">
+                    <a16:rowId xmlns:a16="http://schemas.microsoft.com/office/drawing/2014/main" val="1829265797"/>
+                  </a:ext>
+                </a:extLst>
+              </a:tr>
+              <a:tr h="0">
+                <a:tc>
+                  <a:txBody>
+                    <a:bodyPr/>
+                    <a:lstStyle/>
+                    <a:p>
+                      <a:pPr marL="0" marR="0" fontAlgn="t">
+                        <a:spcBef>
+                          <a:spcPts val="0"/>
+                        </a:spcBef>
+                        <a:spcAft>
+                          <a:spcPts val="0"/>
+                        </a:spcAft>
+                      </a:pPr>
+                      <a:r>
+                        <a:rPr lang="en-US" sz="2400" dirty="0" err="1">
+                          <a:effectLst/>
+                          <a:latin typeface="Quicksand Medium" charset="0"/>
+                        </a:rPr>
+                        <a:t>Eertree</a:t>
+                      </a:r>
+                      <a:endParaRPr lang="en-US" sz="2400" dirty="0">
+                        <a:effectLst/>
+                        <a:latin typeface="Quicksand Medium" charset="0"/>
+                      </a:endParaRPr>
+                    </a:p>
+                  </a:txBody>
+                  <a:tcPr marL="50800" marR="50800" marT="50800" marB="50800">
+                    <a:lnL w="12700" cap="flat" cmpd="sng" algn="ctr">
+                      <a:solidFill>
+                        <a:srgbClr val="A3A3A3"/>
+                      </a:solidFill>
+                      <a:prstDash val="solid"/>
+                      <a:round/>
+                      <a:headEnd type="none" w="med" len="med"/>
+                      <a:tailEnd type="none" w="med" len="med"/>
+                    </a:lnL>
+                    <a:lnR w="12700" cap="flat" cmpd="sng" algn="ctr">
+                      <a:solidFill>
+                        <a:srgbClr val="A3A3A3"/>
+                      </a:solidFill>
+                      <a:prstDash val="solid"/>
+                      <a:round/>
+                      <a:headEnd type="none" w="med" len="med"/>
+                      <a:tailEnd type="none" w="med" len="med"/>
+                    </a:lnR>
+                    <a:lnT w="12700" cap="flat" cmpd="sng" algn="ctr">
+                      <a:solidFill>
+                        <a:srgbClr val="A3A3A3"/>
+                      </a:solidFill>
+                      <a:prstDash val="solid"/>
+                      <a:round/>
+                      <a:headEnd type="none" w="med" len="med"/>
+                      <a:tailEnd type="none" w="med" len="med"/>
+                    </a:lnT>
+                    <a:lnB w="12700" cap="flat" cmpd="sng" algn="ctr">
+                      <a:solidFill>
+                        <a:srgbClr val="A3A3A3"/>
+                      </a:solidFill>
+                      <a:prstDash val="solid"/>
+                      <a:round/>
+                      <a:headEnd type="none" w="med" len="med"/>
+                      <a:tailEnd type="none" w="med" len="med"/>
+                    </a:lnB>
+                  </a:tcPr>
+                </a:tc>
+                <a:tc>
+                  <a:txBody>
+                    <a:bodyPr/>
+                    <a:lstStyle/>
+                    <a:p>
+                      <a:pPr marL="0" marR="0" fontAlgn="t">
+                        <a:spcBef>
+                          <a:spcPts val="0"/>
+                        </a:spcBef>
+                        <a:spcAft>
+                          <a:spcPts val="0"/>
+                        </a:spcAft>
+                      </a:pPr>
+                      <a:r>
+                        <a:rPr lang="en-US" sz="2400" b="1" i="1">
+                          <a:effectLst/>
+                          <a:latin typeface="Cambria" panose="02040503050406030204" pitchFamily="18" charset="0"/>
+                          <a:ea typeface="Cambria" panose="02040503050406030204" pitchFamily="18" charset="0"/>
+                        </a:rPr>
+                        <a:t>O</a:t>
+                      </a:r>
+                      <a:r>
+                        <a:rPr lang="el-GR" sz="2400" b="1" i="1">
+                          <a:effectLst/>
+                          <a:latin typeface="Cambria" panose="02040503050406030204" pitchFamily="18" charset="0"/>
+                          <a:ea typeface="Cambria" panose="02040503050406030204" pitchFamily="18" charset="0"/>
+                        </a:rPr>
+                        <a:t>(</a:t>
+                      </a:r>
+                      <a:r>
+                        <a:rPr lang="en-US" sz="2400" b="1" i="1">
+                          <a:effectLst/>
+                          <a:latin typeface="Cambria" panose="02040503050406030204" pitchFamily="18" charset="0"/>
+                          <a:ea typeface="Cambria" panose="02040503050406030204" pitchFamily="18" charset="0"/>
+                        </a:rPr>
+                        <a:t>n)</a:t>
+                      </a:r>
+                    </a:p>
+                  </a:txBody>
+                  <a:tcPr marL="50800" marR="50800" marT="50800" marB="50800">
+                    <a:lnL w="12700" cap="flat" cmpd="sng" algn="ctr">
+                      <a:solidFill>
+                        <a:srgbClr val="A3A3A3"/>
+                      </a:solidFill>
+                      <a:prstDash val="solid"/>
+                      <a:round/>
+                      <a:headEnd type="none" w="med" len="med"/>
+                      <a:tailEnd type="none" w="med" len="med"/>
+                    </a:lnL>
+                    <a:lnR w="12700" cap="flat" cmpd="sng" algn="ctr">
+                      <a:solidFill>
+                        <a:srgbClr val="A3A3A3"/>
+                      </a:solidFill>
+                      <a:prstDash val="solid"/>
+                      <a:round/>
+                      <a:headEnd type="none" w="med" len="med"/>
+                      <a:tailEnd type="none" w="med" len="med"/>
+                    </a:lnR>
+                    <a:lnT w="12700" cap="flat" cmpd="sng" algn="ctr">
+                      <a:solidFill>
+                        <a:srgbClr val="A3A3A3"/>
+                      </a:solidFill>
+                      <a:prstDash val="solid"/>
+                      <a:round/>
+                      <a:headEnd type="none" w="med" len="med"/>
+                      <a:tailEnd type="none" w="med" len="med"/>
+                    </a:lnT>
+                    <a:lnB w="12700" cap="flat" cmpd="sng" algn="ctr">
+                      <a:solidFill>
+                        <a:srgbClr val="A3A3A3"/>
+                      </a:solidFill>
+                      <a:prstDash val="solid"/>
+                      <a:round/>
+                      <a:headEnd type="none" w="med" len="med"/>
+                      <a:tailEnd type="none" w="med" len="med"/>
+                    </a:lnB>
+                  </a:tcPr>
+                </a:tc>
+                <a:tc>
+                  <a:txBody>
+                    <a:bodyPr/>
+                    <a:lstStyle/>
+                    <a:p>
+                      <a:pPr marL="0" marR="0" fontAlgn="t">
+                        <a:spcBef>
+                          <a:spcPts val="0"/>
+                        </a:spcBef>
+                        <a:spcAft>
+                          <a:spcPts val="0"/>
+                        </a:spcAft>
+                      </a:pPr>
+                      <a:r>
+                        <a:rPr lang="en-US" sz="2400" b="1" i="1" dirty="0">
+                          <a:effectLst/>
+                          <a:latin typeface="Cambria" panose="02040503050406030204" pitchFamily="18" charset="0"/>
+                          <a:ea typeface="Cambria" panose="02040503050406030204" pitchFamily="18" charset="0"/>
+                        </a:rPr>
+                        <a:t>O(</a:t>
+                      </a:r>
+                      <a:r>
+                        <a:rPr lang="en-US" sz="2400" b="1" i="1" dirty="0" err="1">
+                          <a:effectLst/>
+                          <a:latin typeface="Cambria" panose="02040503050406030204" pitchFamily="18" charset="0"/>
+                          <a:ea typeface="Cambria" panose="02040503050406030204" pitchFamily="18" charset="0"/>
+                        </a:rPr>
+                        <a:t>nlog</a:t>
+                      </a:r>
+                      <a:r>
+                        <a:rPr lang="el-GR" sz="2400" b="1" i="1" dirty="0">
+                          <a:effectLst/>
+                          <a:latin typeface="Cambria" panose="02040503050406030204" pitchFamily="18" charset="0"/>
+                          <a:ea typeface="Cambria" panose="02040503050406030204" pitchFamily="18" charset="0"/>
+                        </a:rPr>
+                        <a:t>σ</a:t>
+                      </a:r>
+                      <a:r>
+                        <a:rPr lang="en-US" sz="2400" b="1" i="1" dirty="0">
+                          <a:effectLst/>
+                          <a:latin typeface="Cambria" panose="02040503050406030204" pitchFamily="18" charset="0"/>
+                          <a:ea typeface="Cambria" panose="02040503050406030204" pitchFamily="18" charset="0"/>
+                        </a:rPr>
+                        <a:t>)</a:t>
+                      </a:r>
+                    </a:p>
+                  </a:txBody>
+                  <a:tcPr marL="50800" marR="50800" marT="50800" marB="50800">
+                    <a:lnL w="12700" cap="flat" cmpd="sng" algn="ctr">
+                      <a:solidFill>
+                        <a:srgbClr val="A3A3A3"/>
+                      </a:solidFill>
+                      <a:prstDash val="solid"/>
+                      <a:round/>
+                      <a:headEnd type="none" w="med" len="med"/>
+                      <a:tailEnd type="none" w="med" len="med"/>
+                    </a:lnL>
+                    <a:lnR w="12700" cap="flat" cmpd="sng" algn="ctr">
+                      <a:solidFill>
+                        <a:srgbClr val="A3A3A3"/>
+                      </a:solidFill>
+                      <a:prstDash val="solid"/>
+                      <a:round/>
+                      <a:headEnd type="none" w="med" len="med"/>
+                      <a:tailEnd type="none" w="med" len="med"/>
+                    </a:lnR>
+                    <a:lnT w="12700" cap="flat" cmpd="sng" algn="ctr">
+                      <a:solidFill>
+                        <a:srgbClr val="A3A3A3"/>
+                      </a:solidFill>
+                      <a:prstDash val="solid"/>
+                      <a:round/>
+                      <a:headEnd type="none" w="med" len="med"/>
+                      <a:tailEnd type="none" w="med" len="med"/>
+                    </a:lnT>
+                    <a:lnB w="12700" cap="flat" cmpd="sng" algn="ctr">
+                      <a:solidFill>
+                        <a:srgbClr val="A3A3A3"/>
+                      </a:solidFill>
+                      <a:prstDash val="solid"/>
+                      <a:round/>
+                      <a:headEnd type="none" w="med" len="med"/>
+                      <a:tailEnd type="none" w="med" len="med"/>
+                    </a:lnB>
+                  </a:tcPr>
+                </a:tc>
+                <a:extLst>
+                  <a:ext uri="{0D108BD9-81ED-4DB2-BD59-A6C34878D82A}">
+                    <a16:rowId xmlns:a16="http://schemas.microsoft.com/office/drawing/2014/main" val="3633516512"/>
+                  </a:ext>
+                </a:extLst>
+              </a:tr>
+            </a:tbl>
+          </a:graphicData>
+        </a:graphic>
+      </p:graphicFrame>
     </p:spTree>
     <p:extLst>
       <p:ext uri="{BB962C8B-B14F-4D97-AF65-F5344CB8AC3E}">
@@ -50028,6 +53749,81 @@
   <p:clrMapOvr>
     <a:masterClrMapping/>
   </p:clrMapOvr>
+  <p:timing>
+    <p:tnLst>
+      <p:par>
+        <p:cTn id="1" dur="indefinite" restart="never" nodeType="tmRoot">
+          <p:childTnLst>
+            <p:seq concurrent="1" nextAc="seek">
+              <p:cTn id="2" dur="indefinite" nodeType="mainSeq">
+                <p:childTnLst>
+                  <p:par>
+                    <p:cTn id="3" fill="hold">
+                      <p:stCondLst>
+                        <p:cond delay="indefinite"/>
+                      </p:stCondLst>
+                      <p:childTnLst>
+                        <p:par>
+                          <p:cTn id="4" fill="hold">
+                            <p:stCondLst>
+                              <p:cond delay="0"/>
+                            </p:stCondLst>
+                            <p:childTnLst>
+                              <p:par>
+                                <p:cTn id="5" presetID="1" presetClass="entr" presetSubtype="0" fill="hold" nodeType="clickEffect">
+                                  <p:stCondLst>
+                                    <p:cond delay="0"/>
+                                  </p:stCondLst>
+                                  <p:childTnLst>
+                                    <p:set>
+                                      <p:cBhvr>
+                                        <p:cTn id="6" dur="1" fill="hold">
+                                          <p:stCondLst>
+                                            <p:cond delay="0"/>
+                                          </p:stCondLst>
+                                        </p:cTn>
+                                        <p:tgtEl>
+                                          <p:spTgt spid="3"/>
+                                        </p:tgtEl>
+                                        <p:attrNameLst>
+                                          <p:attrName>style.visibility</p:attrName>
+                                        </p:attrNameLst>
+                                      </p:cBhvr>
+                                      <p:to>
+                                        <p:strVal val="visible"/>
+                                      </p:to>
+                                    </p:set>
+                                  </p:childTnLst>
+                                </p:cTn>
+                              </p:par>
+                            </p:childTnLst>
+                          </p:cTn>
+                        </p:par>
+                      </p:childTnLst>
+                    </p:cTn>
+                  </p:par>
+                </p:childTnLst>
+              </p:cTn>
+              <p:prevCondLst>
+                <p:cond evt="onPrev" delay="0">
+                  <p:tgtEl>
+                    <p:sldTgt/>
+                  </p:tgtEl>
+                </p:cond>
+              </p:prevCondLst>
+              <p:nextCondLst>
+                <p:cond evt="onNext" delay="0">
+                  <p:tgtEl>
+                    <p:sldTgt/>
+                  </p:tgtEl>
+                </p:cond>
+              </p:nextCondLst>
+            </p:seq>
+          </p:childTnLst>
+        </p:cTn>
+      </p:par>
+    </p:tnLst>
+  </p:timing>
 </p:sld>
 </file>
 

</xml_diff>